<commit_message>
Relationships / Cost of Collections: Figures.
</commit_message>
<xml_diff>
--- a/part1/Figures/collections/inside-arraylist.pptx
+++ b/part1/Figures/collections/inside-arraylist.pptx
@@ -1,11 +1,14 @@
 
 <file path=ppt/presentation.xml><?xml version="1.0" encoding="utf-8"?>
-<p:presentation xmlns:a="http://schemas.openxmlformats.org/drawingml/2006/main" xmlns:r="http://schemas.openxmlformats.org/officeDocument/2006/relationships" xmlns:mc="http://schemas.openxmlformats.org/markup-compatibility/2006" xmlns:mv="urn:schemas-microsoft-com:mac:vml" xmlns:p="http://schemas.openxmlformats.org/presentationml/2006/main" mc:Ignorable="mv" mc:PreserveAttributes="mv:*" saveSubsetFonts="1" autoCompressPictures="0">
+<p:presentation xmlns:a="http://schemas.openxmlformats.org/drawingml/2006/main" xmlns:r="http://schemas.openxmlformats.org/officeDocument/2006/relationships" xmlns:p="http://schemas.openxmlformats.org/presentationml/2006/main" saveSubsetFonts="1" autoCompressPictures="0">
   <p:sldMasterIdLst>
     <p:sldMasterId id="2147483648" r:id="rId1"/>
   </p:sldMasterIdLst>
+  <p:notesMasterIdLst>
+    <p:notesMasterId r:id="rId3"/>
+  </p:notesMasterIdLst>
   <p:sldIdLst>
-    <p:sldId id="256" r:id="rId2"/>
+    <p:sldId id="257" r:id="rId2"/>
   </p:sldIdLst>
   <p:sldSz cx="9144000" cy="6858000" type="screen4x3"/>
   <p:notesSz cx="6858000" cy="9144000"/>
@@ -13,8 +16,388 @@
     <a:defPPr>
       <a:defRPr lang="en-US"/>
     </a:defPPr>
+    <a:lvl1pPr algn="l" defTabSz="457200" rtl="0" fontAlgn="base">
+      <a:spcBef>
+        <a:spcPct val="0"/>
+      </a:spcBef>
+      <a:spcAft>
+        <a:spcPct val="0"/>
+      </a:spcAft>
+      <a:defRPr kern="1200">
+        <a:solidFill>
+          <a:schemeClr val="tx1"/>
+        </a:solidFill>
+        <a:latin typeface="Arial" charset="0"/>
+        <a:ea typeface="+mn-ea"/>
+        <a:cs typeface="Arial" charset="0"/>
+      </a:defRPr>
+    </a:lvl1pPr>
+    <a:lvl2pPr marL="457200" algn="l" defTabSz="457200" rtl="0" fontAlgn="base">
+      <a:spcBef>
+        <a:spcPct val="0"/>
+      </a:spcBef>
+      <a:spcAft>
+        <a:spcPct val="0"/>
+      </a:spcAft>
+      <a:defRPr kern="1200">
+        <a:solidFill>
+          <a:schemeClr val="tx1"/>
+        </a:solidFill>
+        <a:latin typeface="Arial" charset="0"/>
+        <a:ea typeface="+mn-ea"/>
+        <a:cs typeface="Arial" charset="0"/>
+      </a:defRPr>
+    </a:lvl2pPr>
+    <a:lvl3pPr marL="914400" algn="l" defTabSz="457200" rtl="0" fontAlgn="base">
+      <a:spcBef>
+        <a:spcPct val="0"/>
+      </a:spcBef>
+      <a:spcAft>
+        <a:spcPct val="0"/>
+      </a:spcAft>
+      <a:defRPr kern="1200">
+        <a:solidFill>
+          <a:schemeClr val="tx1"/>
+        </a:solidFill>
+        <a:latin typeface="Arial" charset="0"/>
+        <a:ea typeface="+mn-ea"/>
+        <a:cs typeface="Arial" charset="0"/>
+      </a:defRPr>
+    </a:lvl3pPr>
+    <a:lvl4pPr marL="1371600" algn="l" defTabSz="457200" rtl="0" fontAlgn="base">
+      <a:spcBef>
+        <a:spcPct val="0"/>
+      </a:spcBef>
+      <a:spcAft>
+        <a:spcPct val="0"/>
+      </a:spcAft>
+      <a:defRPr kern="1200">
+        <a:solidFill>
+          <a:schemeClr val="tx1"/>
+        </a:solidFill>
+        <a:latin typeface="Arial" charset="0"/>
+        <a:ea typeface="+mn-ea"/>
+        <a:cs typeface="Arial" charset="0"/>
+      </a:defRPr>
+    </a:lvl4pPr>
+    <a:lvl5pPr marL="1828800" algn="l" defTabSz="457200" rtl="0" fontAlgn="base">
+      <a:spcBef>
+        <a:spcPct val="0"/>
+      </a:spcBef>
+      <a:spcAft>
+        <a:spcPct val="0"/>
+      </a:spcAft>
+      <a:defRPr kern="1200">
+        <a:solidFill>
+          <a:schemeClr val="tx1"/>
+        </a:solidFill>
+        <a:latin typeface="Arial" charset="0"/>
+        <a:ea typeface="+mn-ea"/>
+        <a:cs typeface="Arial" charset="0"/>
+      </a:defRPr>
+    </a:lvl5pPr>
+    <a:lvl6pPr marL="2286000" algn="l" defTabSz="914400" rtl="0" eaLnBrk="1" latinLnBrk="0" hangingPunct="1">
+      <a:defRPr kern="1200">
+        <a:solidFill>
+          <a:schemeClr val="tx1"/>
+        </a:solidFill>
+        <a:latin typeface="Arial" charset="0"/>
+        <a:ea typeface="+mn-ea"/>
+        <a:cs typeface="Arial" charset="0"/>
+      </a:defRPr>
+    </a:lvl6pPr>
+    <a:lvl7pPr marL="2743200" algn="l" defTabSz="914400" rtl="0" eaLnBrk="1" latinLnBrk="0" hangingPunct="1">
+      <a:defRPr kern="1200">
+        <a:solidFill>
+          <a:schemeClr val="tx1"/>
+        </a:solidFill>
+        <a:latin typeface="Arial" charset="0"/>
+        <a:ea typeface="+mn-ea"/>
+        <a:cs typeface="Arial" charset="0"/>
+      </a:defRPr>
+    </a:lvl7pPr>
+    <a:lvl8pPr marL="3200400" algn="l" defTabSz="914400" rtl="0" eaLnBrk="1" latinLnBrk="0" hangingPunct="1">
+      <a:defRPr kern="1200">
+        <a:solidFill>
+          <a:schemeClr val="tx1"/>
+        </a:solidFill>
+        <a:latin typeface="Arial" charset="0"/>
+        <a:ea typeface="+mn-ea"/>
+        <a:cs typeface="Arial" charset="0"/>
+      </a:defRPr>
+    </a:lvl8pPr>
+    <a:lvl9pPr marL="3657600" algn="l" defTabSz="914400" rtl="0" eaLnBrk="1" latinLnBrk="0" hangingPunct="1">
+      <a:defRPr kern="1200">
+        <a:solidFill>
+          <a:schemeClr val="tx1"/>
+        </a:solidFill>
+        <a:latin typeface="Arial" charset="0"/>
+        <a:ea typeface="+mn-ea"/>
+        <a:cs typeface="Arial" charset="0"/>
+      </a:defRPr>
+    </a:lvl9pPr>
+  </p:defaultTextStyle>
+</p:presentation>
+</file>
+
+<file path=ppt/notesMasters/notesMaster1.xml><?xml version="1.0" encoding="utf-8"?>
+<p:notesMaster xmlns:a="http://schemas.openxmlformats.org/drawingml/2006/main" xmlns:r="http://schemas.openxmlformats.org/officeDocument/2006/relationships" xmlns:p="http://schemas.openxmlformats.org/presentationml/2006/main">
+  <p:cSld>
+    <p:bg>
+      <p:bgRef idx="1001">
+        <a:schemeClr val="bg1"/>
+      </p:bgRef>
+    </p:bg>
+    <p:spTree>
+      <p:nvGrpSpPr>
+        <p:cNvPr id="1" name=""/>
+        <p:cNvGrpSpPr/>
+        <p:nvPr/>
+      </p:nvGrpSpPr>
+      <p:grpSpPr>
+        <a:xfrm>
+          <a:off x="0" y="0"/>
+          <a:ext cx="0" cy="0"/>
+          <a:chOff x="0" y="0"/>
+          <a:chExt cx="0" cy="0"/>
+        </a:xfrm>
+      </p:grpSpPr>
+      <p:sp>
+        <p:nvSpPr>
+          <p:cNvPr id="2" name="Header Placeholder 1"/>
+          <p:cNvSpPr>
+            <a:spLocks noGrp="1"/>
+          </p:cNvSpPr>
+          <p:nvPr>
+            <p:ph type="hdr" sz="quarter"/>
+          </p:nvPr>
+        </p:nvSpPr>
+        <p:spPr>
+          <a:xfrm>
+            <a:off x="0" y="0"/>
+            <a:ext cx="2971800" cy="457200"/>
+          </a:xfrm>
+          <a:prstGeom prst="rect">
+            <a:avLst/>
+          </a:prstGeom>
+        </p:spPr>
+        <p:txBody>
+          <a:bodyPr vert="horz" lIns="91440" tIns="45720" rIns="91440" bIns="45720" rtlCol="0"/>
+          <a:lstStyle>
+            <a:lvl1pPr algn="l">
+              <a:defRPr sz="1200"/>
+            </a:lvl1pPr>
+          </a:lstStyle>
+          <a:p>
+            <a:endParaRPr lang="en-US" dirty="0"/>
+          </a:p>
+        </p:txBody>
+      </p:sp>
+      <p:sp>
+        <p:nvSpPr>
+          <p:cNvPr id="3" name="Date Placeholder 2"/>
+          <p:cNvSpPr>
+            <a:spLocks noGrp="1"/>
+          </p:cNvSpPr>
+          <p:nvPr>
+            <p:ph type="dt" idx="1"/>
+          </p:nvPr>
+        </p:nvSpPr>
+        <p:spPr>
+          <a:xfrm>
+            <a:off x="3884613" y="0"/>
+            <a:ext cx="2971800" cy="457200"/>
+          </a:xfrm>
+          <a:prstGeom prst="rect">
+            <a:avLst/>
+          </a:prstGeom>
+        </p:spPr>
+        <p:txBody>
+          <a:bodyPr vert="horz" lIns="91440" tIns="45720" rIns="91440" bIns="45720" rtlCol="0"/>
+          <a:lstStyle>
+            <a:lvl1pPr algn="r">
+              <a:defRPr sz="1200"/>
+            </a:lvl1pPr>
+          </a:lstStyle>
+          <a:p>
+            <a:fld id="{63399E6A-A389-3547-948A-FA1167BEF3D4}" type="datetimeFigureOut">
+              <a:rPr lang="en-US" smtClean="0"/>
+              <a:t>7/6/12</a:t>
+            </a:fld>
+            <a:endParaRPr lang="en-US" dirty="0"/>
+          </a:p>
+        </p:txBody>
+      </p:sp>
+      <p:sp>
+        <p:nvSpPr>
+          <p:cNvPr id="4" name="Slide Image Placeholder 3"/>
+          <p:cNvSpPr>
+            <a:spLocks noGrp="1" noRot="1" noChangeAspect="1"/>
+          </p:cNvSpPr>
+          <p:nvPr>
+            <p:ph type="sldImg" idx="2"/>
+          </p:nvPr>
+        </p:nvSpPr>
+        <p:spPr>
+          <a:xfrm>
+            <a:off x="1143000" y="685800"/>
+            <a:ext cx="4572000" cy="3429000"/>
+          </a:xfrm>
+          <a:prstGeom prst="rect">
+            <a:avLst/>
+          </a:prstGeom>
+          <a:noFill/>
+          <a:ln w="12700">
+            <a:solidFill>
+              <a:prstClr val="black"/>
+            </a:solidFill>
+          </a:ln>
+        </p:spPr>
+        <p:txBody>
+          <a:bodyPr vert="horz" lIns="91440" tIns="45720" rIns="91440" bIns="45720" rtlCol="0" anchor="ctr"/>
+          <a:lstStyle/>
+          <a:p>
+            <a:endParaRPr lang="en-US" dirty="0"/>
+          </a:p>
+        </p:txBody>
+      </p:sp>
+      <p:sp>
+        <p:nvSpPr>
+          <p:cNvPr id="5" name="Notes Placeholder 4"/>
+          <p:cNvSpPr>
+            <a:spLocks noGrp="1"/>
+          </p:cNvSpPr>
+          <p:nvPr>
+            <p:ph type="body" sz="quarter" idx="3"/>
+          </p:nvPr>
+        </p:nvSpPr>
+        <p:spPr>
+          <a:xfrm>
+            <a:off x="685800" y="4343400"/>
+            <a:ext cx="5486400" cy="4114800"/>
+          </a:xfrm>
+          <a:prstGeom prst="rect">
+            <a:avLst/>
+          </a:prstGeom>
+        </p:spPr>
+        <p:txBody>
+          <a:bodyPr vert="horz" lIns="91440" tIns="45720" rIns="91440" bIns="45720" rtlCol="0"/>
+          <a:lstStyle/>
+          <a:p>
+            <a:pPr lvl="0"/>
+            <a:r>
+              <a:rPr lang="en-US" smtClean="0"/>
+              <a:t>Click to edit Master text styles</a:t>
+            </a:r>
+          </a:p>
+          <a:p>
+            <a:pPr lvl="1"/>
+            <a:r>
+              <a:rPr lang="en-US" smtClean="0"/>
+              <a:t>Second level</a:t>
+            </a:r>
+          </a:p>
+          <a:p>
+            <a:pPr lvl="2"/>
+            <a:r>
+              <a:rPr lang="en-US" smtClean="0"/>
+              <a:t>Third level</a:t>
+            </a:r>
+          </a:p>
+          <a:p>
+            <a:pPr lvl="3"/>
+            <a:r>
+              <a:rPr lang="en-US" smtClean="0"/>
+              <a:t>Fourth level</a:t>
+            </a:r>
+          </a:p>
+          <a:p>
+            <a:pPr lvl="4"/>
+            <a:r>
+              <a:rPr lang="en-US" smtClean="0"/>
+              <a:t>Fifth level</a:t>
+            </a:r>
+            <a:endParaRPr lang="en-US"/>
+          </a:p>
+        </p:txBody>
+      </p:sp>
+      <p:sp>
+        <p:nvSpPr>
+          <p:cNvPr id="6" name="Footer Placeholder 5"/>
+          <p:cNvSpPr>
+            <a:spLocks noGrp="1"/>
+          </p:cNvSpPr>
+          <p:nvPr>
+            <p:ph type="ftr" sz="quarter" idx="4"/>
+          </p:nvPr>
+        </p:nvSpPr>
+        <p:spPr>
+          <a:xfrm>
+            <a:off x="0" y="8685213"/>
+            <a:ext cx="2971800" cy="457200"/>
+          </a:xfrm>
+          <a:prstGeom prst="rect">
+            <a:avLst/>
+          </a:prstGeom>
+        </p:spPr>
+        <p:txBody>
+          <a:bodyPr vert="horz" lIns="91440" tIns="45720" rIns="91440" bIns="45720" rtlCol="0" anchor="b"/>
+          <a:lstStyle>
+            <a:lvl1pPr algn="l">
+              <a:defRPr sz="1200"/>
+            </a:lvl1pPr>
+          </a:lstStyle>
+          <a:p>
+            <a:endParaRPr lang="en-US" dirty="0"/>
+          </a:p>
+        </p:txBody>
+      </p:sp>
+      <p:sp>
+        <p:nvSpPr>
+          <p:cNvPr id="7" name="Slide Number Placeholder 6"/>
+          <p:cNvSpPr>
+            <a:spLocks noGrp="1"/>
+          </p:cNvSpPr>
+          <p:nvPr>
+            <p:ph type="sldNum" sz="quarter" idx="5"/>
+          </p:nvPr>
+        </p:nvSpPr>
+        <p:spPr>
+          <a:xfrm>
+            <a:off x="3884613" y="8685213"/>
+            <a:ext cx="2971800" cy="457200"/>
+          </a:xfrm>
+          <a:prstGeom prst="rect">
+            <a:avLst/>
+          </a:prstGeom>
+        </p:spPr>
+        <p:txBody>
+          <a:bodyPr vert="horz" lIns="91440" tIns="45720" rIns="91440" bIns="45720" rtlCol="0" anchor="b"/>
+          <a:lstStyle>
+            <a:lvl1pPr algn="r">
+              <a:defRPr sz="1200"/>
+            </a:lvl1pPr>
+          </a:lstStyle>
+          <a:p>
+            <a:fld id="{26E6EE75-3F2A-9041-8B1A-2272835C97F9}" type="slidenum">
+              <a:rPr lang="en-US" smtClean="0"/>
+              <a:t>‹#›</a:t>
+            </a:fld>
+            <a:endParaRPr lang="en-US" dirty="0"/>
+          </a:p>
+        </p:txBody>
+      </p:sp>
+    </p:spTree>
+    <p:extLst>
+      <p:ext uri="{BB962C8B-B14F-4D97-AF65-F5344CB8AC3E}">
+        <p14:creationId xmlns:p14="http://schemas.microsoft.com/office/powerpoint/2010/main" val="1933097513"/>
+      </p:ext>
+    </p:extLst>
+  </p:cSld>
+  <p:clrMap bg1="lt1" tx1="dk1" bg2="lt2" tx2="dk2" accent1="accent1" accent2="accent2" accent3="accent3" accent4="accent4" accent5="accent5" accent6="accent6" hlink="hlink" folHlink="folHlink"/>
+  <p:notesStyle>
     <a:lvl1pPr marL="0" algn="l" defTabSz="457200" rtl="0" eaLnBrk="1" latinLnBrk="0" hangingPunct="1">
-      <a:defRPr sz="1800" kern="1200">
+      <a:defRPr sz="1200" kern="1200">
         <a:solidFill>
           <a:schemeClr val="tx1"/>
         </a:solidFill>
@@ -24,7 +407,7 @@
       </a:defRPr>
     </a:lvl1pPr>
     <a:lvl2pPr marL="457200" algn="l" defTabSz="457200" rtl="0" eaLnBrk="1" latinLnBrk="0" hangingPunct="1">
-      <a:defRPr sz="1800" kern="1200">
+      <a:defRPr sz="1200" kern="1200">
         <a:solidFill>
           <a:schemeClr val="tx1"/>
         </a:solidFill>
@@ -34,7 +417,7 @@
       </a:defRPr>
     </a:lvl2pPr>
     <a:lvl3pPr marL="914400" algn="l" defTabSz="457200" rtl="0" eaLnBrk="1" latinLnBrk="0" hangingPunct="1">
-      <a:defRPr sz="1800" kern="1200">
+      <a:defRPr sz="1200" kern="1200">
         <a:solidFill>
           <a:schemeClr val="tx1"/>
         </a:solidFill>
@@ -44,7 +427,7 @@
       </a:defRPr>
     </a:lvl3pPr>
     <a:lvl4pPr marL="1371600" algn="l" defTabSz="457200" rtl="0" eaLnBrk="1" latinLnBrk="0" hangingPunct="1">
-      <a:defRPr sz="1800" kern="1200">
+      <a:defRPr sz="1200" kern="1200">
         <a:solidFill>
           <a:schemeClr val="tx1"/>
         </a:solidFill>
@@ -54,7 +437,7 @@
       </a:defRPr>
     </a:lvl4pPr>
     <a:lvl5pPr marL="1828800" algn="l" defTabSz="457200" rtl="0" eaLnBrk="1" latinLnBrk="0" hangingPunct="1">
-      <a:defRPr sz="1800" kern="1200">
+      <a:defRPr sz="1200" kern="1200">
         <a:solidFill>
           <a:schemeClr val="tx1"/>
         </a:solidFill>
@@ -64,7 +447,7 @@
       </a:defRPr>
     </a:lvl5pPr>
     <a:lvl6pPr marL="2286000" algn="l" defTabSz="457200" rtl="0" eaLnBrk="1" latinLnBrk="0" hangingPunct="1">
-      <a:defRPr sz="1800" kern="1200">
+      <a:defRPr sz="1200" kern="1200">
         <a:solidFill>
           <a:schemeClr val="tx1"/>
         </a:solidFill>
@@ -74,7 +457,7 @@
       </a:defRPr>
     </a:lvl6pPr>
     <a:lvl7pPr marL="2743200" algn="l" defTabSz="457200" rtl="0" eaLnBrk="1" latinLnBrk="0" hangingPunct="1">
-      <a:defRPr sz="1800" kern="1200">
+      <a:defRPr sz="1200" kern="1200">
         <a:solidFill>
           <a:schemeClr val="tx1"/>
         </a:solidFill>
@@ -84,7 +467,7 @@
       </a:defRPr>
     </a:lvl7pPr>
     <a:lvl8pPr marL="3200400" algn="l" defTabSz="457200" rtl="0" eaLnBrk="1" latinLnBrk="0" hangingPunct="1">
-      <a:defRPr sz="1800" kern="1200">
+      <a:defRPr sz="1200" kern="1200">
         <a:solidFill>
           <a:schemeClr val="tx1"/>
         </a:solidFill>
@@ -94,7 +477,7 @@
       </a:defRPr>
     </a:lvl8pPr>
     <a:lvl9pPr marL="3657600" algn="l" defTabSz="457200" rtl="0" eaLnBrk="1" latinLnBrk="0" hangingPunct="1">
-      <a:defRPr sz="1800" kern="1200">
+      <a:defRPr sz="1200" kern="1200">
         <a:solidFill>
           <a:schemeClr val="tx1"/>
         </a:solidFill>
@@ -103,12 +486,96 @@
         <a:cs typeface="+mn-cs"/>
       </a:defRPr>
     </a:lvl9pPr>
-  </p:defaultTextStyle>
-</p:presentation>
+  </p:notesStyle>
+</p:notesMaster>
+</file>
+
+<file path=ppt/notesSlides/notesSlide1.xml><?xml version="1.0" encoding="utf-8"?>
+<p:notes xmlns:a="http://schemas.openxmlformats.org/drawingml/2006/main" xmlns:r="http://schemas.openxmlformats.org/officeDocument/2006/relationships" xmlns:p="http://schemas.openxmlformats.org/presentationml/2006/main">
+  <p:cSld>
+    <p:spTree>
+      <p:nvGrpSpPr>
+        <p:cNvPr id="1" name=""/>
+        <p:cNvGrpSpPr/>
+        <p:nvPr/>
+      </p:nvGrpSpPr>
+      <p:grpSpPr>
+        <a:xfrm>
+          <a:off x="0" y="0"/>
+          <a:ext cx="0" cy="0"/>
+          <a:chOff x="0" y="0"/>
+          <a:chExt cx="0" cy="0"/>
+        </a:xfrm>
+      </p:grpSpPr>
+      <p:sp>
+        <p:nvSpPr>
+          <p:cNvPr id="2" name="Slide Image Placeholder 1"/>
+          <p:cNvSpPr>
+            <a:spLocks noGrp="1" noRot="1" noChangeAspect="1"/>
+          </p:cNvSpPr>
+          <p:nvPr>
+            <p:ph type="sldImg"/>
+          </p:nvPr>
+        </p:nvSpPr>
+        <p:spPr/>
+      </p:sp>
+      <p:sp>
+        <p:nvSpPr>
+          <p:cNvPr id="3" name="Notes Placeholder 2"/>
+          <p:cNvSpPr>
+            <a:spLocks noGrp="1"/>
+          </p:cNvSpPr>
+          <p:nvPr>
+            <p:ph type="body" idx="1"/>
+          </p:nvPr>
+        </p:nvSpPr>
+        <p:spPr/>
+        <p:txBody>
+          <a:bodyPr/>
+          <a:lstStyle/>
+          <a:p>
+            <a:endParaRPr lang="en-US" dirty="0"/>
+          </a:p>
+        </p:txBody>
+      </p:sp>
+      <p:sp>
+        <p:nvSpPr>
+          <p:cNvPr id="4" name="Slide Number Placeholder 3"/>
+          <p:cNvSpPr>
+            <a:spLocks noGrp="1"/>
+          </p:cNvSpPr>
+          <p:nvPr>
+            <p:ph type="sldNum" sz="quarter" idx="10"/>
+          </p:nvPr>
+        </p:nvSpPr>
+        <p:spPr/>
+        <p:txBody>
+          <a:bodyPr/>
+          <a:lstStyle/>
+          <a:p>
+            <a:fld id="{26E6EE75-3F2A-9041-8B1A-2272835C97F9}" type="slidenum">
+              <a:rPr lang="en-US" smtClean="0"/>
+              <a:t>1</a:t>
+            </a:fld>
+            <a:endParaRPr lang="en-US" dirty="0"/>
+          </a:p>
+        </p:txBody>
+      </p:sp>
+    </p:spTree>
+    <p:extLst>
+      <p:ext uri="{BB962C8B-B14F-4D97-AF65-F5344CB8AC3E}">
+        <p14:creationId xmlns:p14="http://schemas.microsoft.com/office/powerpoint/2010/main" val="3516954612"/>
+      </p:ext>
+    </p:extLst>
+  </p:cSld>
+  <p:clrMapOvr>
+    <a:masterClrMapping/>
+  </p:clrMapOvr>
+</p:notes>
 </file>
 
 <file path=ppt/slideLayouts/slideLayout1.xml><?xml version="1.0" encoding="utf-8"?>
-<p:sldLayout xmlns:a="http://schemas.openxmlformats.org/drawingml/2006/main" xmlns:r="http://schemas.openxmlformats.org/officeDocument/2006/relationships" xmlns:mc="http://schemas.openxmlformats.org/markup-compatibility/2006" xmlns:mv="urn:schemas-microsoft-com:mac:vml" xmlns:p="http://schemas.openxmlformats.org/presentationml/2006/main" mc:Ignorable="mv" mc:PreserveAttributes="mv:*" type="title" preserve="1">
+<p:sldLayout xmlns:a="http://schemas.openxmlformats.org/drawingml/2006/main" xmlns:r="http://schemas.openxmlformats.org/officeDocument/2006/relationships" xmlns:p="http://schemas.openxmlformats.org/presentationml/2006/main" type="title" preserve="1">
   <p:cSld name="Title Slide">
     <p:spTree>
       <p:nvGrpSpPr>
@@ -284,14 +751,23 @@
         <p:spPr/>
         <p:txBody>
           <a:bodyPr/>
-          <a:lstStyle/>
-          <a:p>
-            <a:fld id="{4FCECDFD-BFFC-6141-83BB-B602E64518FB}" type="datetimeFigureOut">
-              <a:rPr lang="en-US" smtClean="0"/>
-              <a:pPr/>
-              <a:t>4/19/11</a:t>
+          <a:lstStyle>
+            <a:lvl1pPr>
+              <a:defRPr/>
+            </a:lvl1pPr>
+          </a:lstStyle>
+          <a:p>
+            <a:pPr>
+              <a:defRPr/>
+            </a:pPr>
+            <a:fld id="{EA869C11-907D-4A7F-9EA7-EFD46A12E100}" type="datetimeFigureOut">
+              <a:rPr lang="en-US"/>
+              <a:pPr>
+                <a:defRPr/>
+              </a:pPr>
+              <a:t>7/6/12</a:t>
             </a:fld>
-            <a:endParaRPr lang="en-US"/>
+            <a:endParaRPr lang="en-US" dirty="0"/>
           </a:p>
         </p:txBody>
       </p:sp>
@@ -308,9 +784,16 @@
         <p:spPr/>
         <p:txBody>
           <a:bodyPr/>
-          <a:lstStyle/>
-          <a:p>
-            <a:endParaRPr lang="en-US"/>
+          <a:lstStyle>
+            <a:lvl1pPr>
+              <a:defRPr/>
+            </a:lvl1pPr>
+          </a:lstStyle>
+          <a:p>
+            <a:pPr>
+              <a:defRPr/>
+            </a:pPr>
+            <a:endParaRPr lang="en-US" dirty="0"/>
           </a:p>
         </p:txBody>
       </p:sp>
@@ -327,14 +810,23 @@
         <p:spPr/>
         <p:txBody>
           <a:bodyPr/>
-          <a:lstStyle/>
-          <a:p>
-            <a:fld id="{8683ECDB-7790-CD47-A480-1CA096506802}" type="slidenum">
-              <a:rPr lang="en-US" smtClean="0"/>
-              <a:pPr/>
+          <a:lstStyle>
+            <a:lvl1pPr>
+              <a:defRPr/>
+            </a:lvl1pPr>
+          </a:lstStyle>
+          <a:p>
+            <a:pPr>
+              <a:defRPr/>
+            </a:pPr>
+            <a:fld id="{C80855D0-533B-4B6F-AF0D-03BF56607AB1}" type="slidenum">
+              <a:rPr lang="en-US"/>
+              <a:pPr>
+                <a:defRPr/>
+              </a:pPr>
               <a:t>‹#›</a:t>
             </a:fld>
-            <a:endParaRPr lang="en-US"/>
+            <a:endParaRPr lang="en-US" dirty="0"/>
           </a:p>
         </p:txBody>
       </p:sp>
@@ -347,7 +839,7 @@
 </file>
 
 <file path=ppt/slideLayouts/slideLayout10.xml><?xml version="1.0" encoding="utf-8"?>
-<p:sldLayout xmlns:a="http://schemas.openxmlformats.org/drawingml/2006/main" xmlns:r="http://schemas.openxmlformats.org/officeDocument/2006/relationships" xmlns:mc="http://schemas.openxmlformats.org/markup-compatibility/2006" xmlns:mv="urn:schemas-microsoft-com:mac:vml" xmlns:p="http://schemas.openxmlformats.org/presentationml/2006/main" mc:Ignorable="mv" mc:PreserveAttributes="mv:*" type="vertTx" preserve="1">
+<p:sldLayout xmlns:a="http://schemas.openxmlformats.org/drawingml/2006/main" xmlns:r="http://schemas.openxmlformats.org/officeDocument/2006/relationships" xmlns:p="http://schemas.openxmlformats.org/presentationml/2006/main" type="vertTx" preserve="1">
   <p:cSld name="Title and Vertical Text">
     <p:spTree>
       <p:nvGrpSpPr>
@@ -451,14 +943,23 @@
         <p:spPr/>
         <p:txBody>
           <a:bodyPr/>
-          <a:lstStyle/>
-          <a:p>
-            <a:fld id="{4FCECDFD-BFFC-6141-83BB-B602E64518FB}" type="datetimeFigureOut">
-              <a:rPr lang="en-US" smtClean="0"/>
-              <a:pPr/>
-              <a:t>4/19/11</a:t>
+          <a:lstStyle>
+            <a:lvl1pPr>
+              <a:defRPr/>
+            </a:lvl1pPr>
+          </a:lstStyle>
+          <a:p>
+            <a:pPr>
+              <a:defRPr/>
+            </a:pPr>
+            <a:fld id="{0467ED37-AAA3-4EAD-A830-705697ADDE64}" type="datetimeFigureOut">
+              <a:rPr lang="en-US"/>
+              <a:pPr>
+                <a:defRPr/>
+              </a:pPr>
+              <a:t>7/6/12</a:t>
             </a:fld>
-            <a:endParaRPr lang="en-US"/>
+            <a:endParaRPr lang="en-US" dirty="0"/>
           </a:p>
         </p:txBody>
       </p:sp>
@@ -475,9 +976,16 @@
         <p:spPr/>
         <p:txBody>
           <a:bodyPr/>
-          <a:lstStyle/>
-          <a:p>
-            <a:endParaRPr lang="en-US"/>
+          <a:lstStyle>
+            <a:lvl1pPr>
+              <a:defRPr/>
+            </a:lvl1pPr>
+          </a:lstStyle>
+          <a:p>
+            <a:pPr>
+              <a:defRPr/>
+            </a:pPr>
+            <a:endParaRPr lang="en-US" dirty="0"/>
           </a:p>
         </p:txBody>
       </p:sp>
@@ -494,14 +1002,23 @@
         <p:spPr/>
         <p:txBody>
           <a:bodyPr/>
-          <a:lstStyle/>
-          <a:p>
-            <a:fld id="{8683ECDB-7790-CD47-A480-1CA096506802}" type="slidenum">
-              <a:rPr lang="en-US" smtClean="0"/>
-              <a:pPr/>
+          <a:lstStyle>
+            <a:lvl1pPr>
+              <a:defRPr/>
+            </a:lvl1pPr>
+          </a:lstStyle>
+          <a:p>
+            <a:pPr>
+              <a:defRPr/>
+            </a:pPr>
+            <a:fld id="{191A86E2-A51C-42C9-AEA2-FEBB4B52279B}" type="slidenum">
+              <a:rPr lang="en-US"/>
+              <a:pPr>
+                <a:defRPr/>
+              </a:pPr>
               <a:t>‹#›</a:t>
             </a:fld>
-            <a:endParaRPr lang="en-US"/>
+            <a:endParaRPr lang="en-US" dirty="0"/>
           </a:p>
         </p:txBody>
       </p:sp>
@@ -514,7 +1031,7 @@
 </file>
 
 <file path=ppt/slideLayouts/slideLayout11.xml><?xml version="1.0" encoding="utf-8"?>
-<p:sldLayout xmlns:a="http://schemas.openxmlformats.org/drawingml/2006/main" xmlns:r="http://schemas.openxmlformats.org/officeDocument/2006/relationships" xmlns:mc="http://schemas.openxmlformats.org/markup-compatibility/2006" xmlns:mv="urn:schemas-microsoft-com:mac:vml" xmlns:p="http://schemas.openxmlformats.org/presentationml/2006/main" mc:Ignorable="mv" mc:PreserveAttributes="mv:*" type="vertTitleAndTx" preserve="1">
+<p:sldLayout xmlns:a="http://schemas.openxmlformats.org/drawingml/2006/main" xmlns:r="http://schemas.openxmlformats.org/officeDocument/2006/relationships" xmlns:p="http://schemas.openxmlformats.org/presentationml/2006/main" type="vertTitleAndTx" preserve="1">
   <p:cSld name="Vertical Title and Text">
     <p:spTree>
       <p:nvGrpSpPr>
@@ -628,14 +1145,23 @@
         <p:spPr/>
         <p:txBody>
           <a:bodyPr/>
-          <a:lstStyle/>
-          <a:p>
-            <a:fld id="{4FCECDFD-BFFC-6141-83BB-B602E64518FB}" type="datetimeFigureOut">
-              <a:rPr lang="en-US" smtClean="0"/>
-              <a:pPr/>
-              <a:t>4/19/11</a:t>
+          <a:lstStyle>
+            <a:lvl1pPr>
+              <a:defRPr/>
+            </a:lvl1pPr>
+          </a:lstStyle>
+          <a:p>
+            <a:pPr>
+              <a:defRPr/>
+            </a:pPr>
+            <a:fld id="{24F69AC6-04E4-4F60-B85D-479D1FB806BE}" type="datetimeFigureOut">
+              <a:rPr lang="en-US"/>
+              <a:pPr>
+                <a:defRPr/>
+              </a:pPr>
+              <a:t>7/6/12</a:t>
             </a:fld>
-            <a:endParaRPr lang="en-US"/>
+            <a:endParaRPr lang="en-US" dirty="0"/>
           </a:p>
         </p:txBody>
       </p:sp>
@@ -652,9 +1178,16 @@
         <p:spPr/>
         <p:txBody>
           <a:bodyPr/>
-          <a:lstStyle/>
-          <a:p>
-            <a:endParaRPr lang="en-US"/>
+          <a:lstStyle>
+            <a:lvl1pPr>
+              <a:defRPr/>
+            </a:lvl1pPr>
+          </a:lstStyle>
+          <a:p>
+            <a:pPr>
+              <a:defRPr/>
+            </a:pPr>
+            <a:endParaRPr lang="en-US" dirty="0"/>
           </a:p>
         </p:txBody>
       </p:sp>
@@ -671,14 +1204,23 @@
         <p:spPr/>
         <p:txBody>
           <a:bodyPr/>
-          <a:lstStyle/>
-          <a:p>
-            <a:fld id="{8683ECDB-7790-CD47-A480-1CA096506802}" type="slidenum">
-              <a:rPr lang="en-US" smtClean="0"/>
-              <a:pPr/>
+          <a:lstStyle>
+            <a:lvl1pPr>
+              <a:defRPr/>
+            </a:lvl1pPr>
+          </a:lstStyle>
+          <a:p>
+            <a:pPr>
+              <a:defRPr/>
+            </a:pPr>
+            <a:fld id="{607962A7-0C62-4D1F-95BE-035BE58672D9}" type="slidenum">
+              <a:rPr lang="en-US"/>
+              <a:pPr>
+                <a:defRPr/>
+              </a:pPr>
               <a:t>‹#›</a:t>
             </a:fld>
-            <a:endParaRPr lang="en-US"/>
+            <a:endParaRPr lang="en-US" dirty="0"/>
           </a:p>
         </p:txBody>
       </p:sp>
@@ -691,7 +1233,7 @@
 </file>
 
 <file path=ppt/slideLayouts/slideLayout2.xml><?xml version="1.0" encoding="utf-8"?>
-<p:sldLayout xmlns:a="http://schemas.openxmlformats.org/drawingml/2006/main" xmlns:r="http://schemas.openxmlformats.org/officeDocument/2006/relationships" xmlns:mc="http://schemas.openxmlformats.org/markup-compatibility/2006" xmlns:mv="urn:schemas-microsoft-com:mac:vml" xmlns:p="http://schemas.openxmlformats.org/presentationml/2006/main" mc:Ignorable="mv" mc:PreserveAttributes="mv:*" type="obj" preserve="1">
+<p:sldLayout xmlns:a="http://schemas.openxmlformats.org/drawingml/2006/main" xmlns:r="http://schemas.openxmlformats.org/officeDocument/2006/relationships" xmlns:p="http://schemas.openxmlformats.org/presentationml/2006/main" type="obj" preserve="1">
   <p:cSld name="Title and Content">
     <p:spTree>
       <p:nvGrpSpPr>
@@ -795,14 +1337,23 @@
         <p:spPr/>
         <p:txBody>
           <a:bodyPr/>
-          <a:lstStyle/>
-          <a:p>
-            <a:fld id="{4FCECDFD-BFFC-6141-83BB-B602E64518FB}" type="datetimeFigureOut">
-              <a:rPr lang="en-US" smtClean="0"/>
-              <a:pPr/>
-              <a:t>4/19/11</a:t>
+          <a:lstStyle>
+            <a:lvl1pPr>
+              <a:defRPr/>
+            </a:lvl1pPr>
+          </a:lstStyle>
+          <a:p>
+            <a:pPr>
+              <a:defRPr/>
+            </a:pPr>
+            <a:fld id="{C44A5AF7-AB9C-430F-ACB2-70583A16FFF2}" type="datetimeFigureOut">
+              <a:rPr lang="en-US"/>
+              <a:pPr>
+                <a:defRPr/>
+              </a:pPr>
+              <a:t>7/6/12</a:t>
             </a:fld>
-            <a:endParaRPr lang="en-US"/>
+            <a:endParaRPr lang="en-US" dirty="0"/>
           </a:p>
         </p:txBody>
       </p:sp>
@@ -819,9 +1370,16 @@
         <p:spPr/>
         <p:txBody>
           <a:bodyPr/>
-          <a:lstStyle/>
-          <a:p>
-            <a:endParaRPr lang="en-US"/>
+          <a:lstStyle>
+            <a:lvl1pPr>
+              <a:defRPr/>
+            </a:lvl1pPr>
+          </a:lstStyle>
+          <a:p>
+            <a:pPr>
+              <a:defRPr/>
+            </a:pPr>
+            <a:endParaRPr lang="en-US" dirty="0"/>
           </a:p>
         </p:txBody>
       </p:sp>
@@ -838,14 +1396,23 @@
         <p:spPr/>
         <p:txBody>
           <a:bodyPr/>
-          <a:lstStyle/>
-          <a:p>
-            <a:fld id="{8683ECDB-7790-CD47-A480-1CA096506802}" type="slidenum">
-              <a:rPr lang="en-US" smtClean="0"/>
-              <a:pPr/>
+          <a:lstStyle>
+            <a:lvl1pPr>
+              <a:defRPr/>
+            </a:lvl1pPr>
+          </a:lstStyle>
+          <a:p>
+            <a:pPr>
+              <a:defRPr/>
+            </a:pPr>
+            <a:fld id="{57736D0B-2229-4661-AA7E-7FFAED76AF03}" type="slidenum">
+              <a:rPr lang="en-US"/>
+              <a:pPr>
+                <a:defRPr/>
+              </a:pPr>
               <a:t>‹#›</a:t>
             </a:fld>
-            <a:endParaRPr lang="en-US"/>
+            <a:endParaRPr lang="en-US" dirty="0"/>
           </a:p>
         </p:txBody>
       </p:sp>
@@ -858,7 +1425,7 @@
 </file>
 
 <file path=ppt/slideLayouts/slideLayout3.xml><?xml version="1.0" encoding="utf-8"?>
-<p:sldLayout xmlns:a="http://schemas.openxmlformats.org/drawingml/2006/main" xmlns:r="http://schemas.openxmlformats.org/officeDocument/2006/relationships" xmlns:mc="http://schemas.openxmlformats.org/markup-compatibility/2006" xmlns:mv="urn:schemas-microsoft-com:mac:vml" xmlns:p="http://schemas.openxmlformats.org/presentationml/2006/main" mc:Ignorable="mv" mc:PreserveAttributes="mv:*" type="secHead" preserve="1">
+<p:sldLayout xmlns:a="http://schemas.openxmlformats.org/drawingml/2006/main" xmlns:r="http://schemas.openxmlformats.org/officeDocument/2006/relationships" xmlns:p="http://schemas.openxmlformats.org/presentationml/2006/main" type="secHead" preserve="1">
   <p:cSld name="Section Header">
     <p:spTree>
       <p:nvGrpSpPr>
@@ -1038,14 +1605,23 @@
         <p:spPr/>
         <p:txBody>
           <a:bodyPr/>
-          <a:lstStyle/>
-          <a:p>
-            <a:fld id="{4FCECDFD-BFFC-6141-83BB-B602E64518FB}" type="datetimeFigureOut">
-              <a:rPr lang="en-US" smtClean="0"/>
-              <a:pPr/>
-              <a:t>4/19/11</a:t>
+          <a:lstStyle>
+            <a:lvl1pPr>
+              <a:defRPr/>
+            </a:lvl1pPr>
+          </a:lstStyle>
+          <a:p>
+            <a:pPr>
+              <a:defRPr/>
+            </a:pPr>
+            <a:fld id="{201E5E0F-B8C0-4ABA-9C6F-CD47FF03D444}" type="datetimeFigureOut">
+              <a:rPr lang="en-US"/>
+              <a:pPr>
+                <a:defRPr/>
+              </a:pPr>
+              <a:t>7/6/12</a:t>
             </a:fld>
-            <a:endParaRPr lang="en-US"/>
+            <a:endParaRPr lang="en-US" dirty="0"/>
           </a:p>
         </p:txBody>
       </p:sp>
@@ -1062,9 +1638,16 @@
         <p:spPr/>
         <p:txBody>
           <a:bodyPr/>
-          <a:lstStyle/>
-          <a:p>
-            <a:endParaRPr lang="en-US"/>
+          <a:lstStyle>
+            <a:lvl1pPr>
+              <a:defRPr/>
+            </a:lvl1pPr>
+          </a:lstStyle>
+          <a:p>
+            <a:pPr>
+              <a:defRPr/>
+            </a:pPr>
+            <a:endParaRPr lang="en-US" dirty="0"/>
           </a:p>
         </p:txBody>
       </p:sp>
@@ -1081,14 +1664,23 @@
         <p:spPr/>
         <p:txBody>
           <a:bodyPr/>
-          <a:lstStyle/>
-          <a:p>
-            <a:fld id="{8683ECDB-7790-CD47-A480-1CA096506802}" type="slidenum">
-              <a:rPr lang="en-US" smtClean="0"/>
-              <a:pPr/>
+          <a:lstStyle>
+            <a:lvl1pPr>
+              <a:defRPr/>
+            </a:lvl1pPr>
+          </a:lstStyle>
+          <a:p>
+            <a:pPr>
+              <a:defRPr/>
+            </a:pPr>
+            <a:fld id="{3D1619AF-B268-45A6-AA9D-F07579FEC687}" type="slidenum">
+              <a:rPr lang="en-US"/>
+              <a:pPr>
+                <a:defRPr/>
+              </a:pPr>
               <a:t>‹#›</a:t>
             </a:fld>
-            <a:endParaRPr lang="en-US"/>
+            <a:endParaRPr lang="en-US" dirty="0"/>
           </a:p>
         </p:txBody>
       </p:sp>
@@ -1101,7 +1693,7 @@
 </file>
 
 <file path=ppt/slideLayouts/slideLayout4.xml><?xml version="1.0" encoding="utf-8"?>
-<p:sldLayout xmlns:a="http://schemas.openxmlformats.org/drawingml/2006/main" xmlns:r="http://schemas.openxmlformats.org/officeDocument/2006/relationships" xmlns:mc="http://schemas.openxmlformats.org/markup-compatibility/2006" xmlns:mv="urn:schemas-microsoft-com:mac:vml" xmlns:p="http://schemas.openxmlformats.org/presentationml/2006/main" mc:Ignorable="mv" mc:PreserveAttributes="mv:*" type="twoObj" preserve="1">
+<p:sldLayout xmlns:a="http://schemas.openxmlformats.org/drawingml/2006/main" xmlns:r="http://schemas.openxmlformats.org/officeDocument/2006/relationships" xmlns:p="http://schemas.openxmlformats.org/presentationml/2006/main" type="twoObj" preserve="1">
   <p:cSld name="Two Content">
     <p:spTree>
       <p:nvGrpSpPr>
@@ -1312,7 +1904,7 @@
       </p:sp>
       <p:sp>
         <p:nvSpPr>
-          <p:cNvPr id="5" name="Date Placeholder 4"/>
+          <p:cNvPr id="5" name="Date Placeholder 3"/>
           <p:cNvSpPr>
             <a:spLocks noGrp="1"/>
           </p:cNvSpPr>
@@ -1323,20 +1915,29 @@
         <p:spPr/>
         <p:txBody>
           <a:bodyPr/>
-          <a:lstStyle/>
-          <a:p>
-            <a:fld id="{4FCECDFD-BFFC-6141-83BB-B602E64518FB}" type="datetimeFigureOut">
-              <a:rPr lang="en-US" smtClean="0"/>
-              <a:pPr/>
-              <a:t>4/19/11</a:t>
+          <a:lstStyle>
+            <a:lvl1pPr>
+              <a:defRPr/>
+            </a:lvl1pPr>
+          </a:lstStyle>
+          <a:p>
+            <a:pPr>
+              <a:defRPr/>
+            </a:pPr>
+            <a:fld id="{EBF747BF-6E29-4437-AC11-2005B4CB9278}" type="datetimeFigureOut">
+              <a:rPr lang="en-US"/>
+              <a:pPr>
+                <a:defRPr/>
+              </a:pPr>
+              <a:t>7/6/12</a:t>
             </a:fld>
-            <a:endParaRPr lang="en-US"/>
-          </a:p>
-        </p:txBody>
-      </p:sp>
-      <p:sp>
-        <p:nvSpPr>
-          <p:cNvPr id="6" name="Footer Placeholder 5"/>
+            <a:endParaRPr lang="en-US" dirty="0"/>
+          </a:p>
+        </p:txBody>
+      </p:sp>
+      <p:sp>
+        <p:nvSpPr>
+          <p:cNvPr id="6" name="Footer Placeholder 4"/>
           <p:cNvSpPr>
             <a:spLocks noGrp="1"/>
           </p:cNvSpPr>
@@ -1347,15 +1948,22 @@
         <p:spPr/>
         <p:txBody>
           <a:bodyPr/>
-          <a:lstStyle/>
-          <a:p>
-            <a:endParaRPr lang="en-US"/>
-          </a:p>
-        </p:txBody>
-      </p:sp>
-      <p:sp>
-        <p:nvSpPr>
-          <p:cNvPr id="7" name="Slide Number Placeholder 6"/>
+          <a:lstStyle>
+            <a:lvl1pPr>
+              <a:defRPr/>
+            </a:lvl1pPr>
+          </a:lstStyle>
+          <a:p>
+            <a:pPr>
+              <a:defRPr/>
+            </a:pPr>
+            <a:endParaRPr lang="en-US" dirty="0"/>
+          </a:p>
+        </p:txBody>
+      </p:sp>
+      <p:sp>
+        <p:nvSpPr>
+          <p:cNvPr id="7" name="Slide Number Placeholder 5"/>
           <p:cNvSpPr>
             <a:spLocks noGrp="1"/>
           </p:cNvSpPr>
@@ -1366,14 +1974,23 @@
         <p:spPr/>
         <p:txBody>
           <a:bodyPr/>
-          <a:lstStyle/>
-          <a:p>
-            <a:fld id="{8683ECDB-7790-CD47-A480-1CA096506802}" type="slidenum">
-              <a:rPr lang="en-US" smtClean="0"/>
-              <a:pPr/>
+          <a:lstStyle>
+            <a:lvl1pPr>
+              <a:defRPr/>
+            </a:lvl1pPr>
+          </a:lstStyle>
+          <a:p>
+            <a:pPr>
+              <a:defRPr/>
+            </a:pPr>
+            <a:fld id="{DFF1E6BD-0AED-4CA9-9911-18A254D86A0B}" type="slidenum">
+              <a:rPr lang="en-US"/>
+              <a:pPr>
+                <a:defRPr/>
+              </a:pPr>
               <a:t>‹#›</a:t>
             </a:fld>
-            <a:endParaRPr lang="en-US"/>
+            <a:endParaRPr lang="en-US" dirty="0"/>
           </a:p>
         </p:txBody>
       </p:sp>
@@ -1386,7 +2003,7 @@
 </file>
 
 <file path=ppt/slideLayouts/slideLayout5.xml><?xml version="1.0" encoding="utf-8"?>
-<p:sldLayout xmlns:a="http://schemas.openxmlformats.org/drawingml/2006/main" xmlns:r="http://schemas.openxmlformats.org/officeDocument/2006/relationships" xmlns:mc="http://schemas.openxmlformats.org/markup-compatibility/2006" xmlns:mv="urn:schemas-microsoft-com:mac:vml" xmlns:p="http://schemas.openxmlformats.org/presentationml/2006/main" mc:Ignorable="mv" mc:PreserveAttributes="mv:*" type="twoTxTwoObj" preserve="1">
+<p:sldLayout xmlns:a="http://schemas.openxmlformats.org/drawingml/2006/main" xmlns:r="http://schemas.openxmlformats.org/officeDocument/2006/relationships" xmlns:p="http://schemas.openxmlformats.org/presentationml/2006/main" type="twoTxTwoObj" preserve="1">
   <p:cSld name="Comparison">
     <p:spTree>
       <p:nvGrpSpPr>
@@ -1731,7 +2348,7 @@
       </p:sp>
       <p:sp>
         <p:nvSpPr>
-          <p:cNvPr id="7" name="Date Placeholder 6"/>
+          <p:cNvPr id="7" name="Date Placeholder 3"/>
           <p:cNvSpPr>
             <a:spLocks noGrp="1"/>
           </p:cNvSpPr>
@@ -1742,20 +2359,29 @@
         <p:spPr/>
         <p:txBody>
           <a:bodyPr/>
-          <a:lstStyle/>
-          <a:p>
-            <a:fld id="{4FCECDFD-BFFC-6141-83BB-B602E64518FB}" type="datetimeFigureOut">
-              <a:rPr lang="en-US" smtClean="0"/>
-              <a:pPr/>
-              <a:t>4/19/11</a:t>
+          <a:lstStyle>
+            <a:lvl1pPr>
+              <a:defRPr/>
+            </a:lvl1pPr>
+          </a:lstStyle>
+          <a:p>
+            <a:pPr>
+              <a:defRPr/>
+            </a:pPr>
+            <a:fld id="{B33299F7-6BA2-4DC5-800A-D39A11919286}" type="datetimeFigureOut">
+              <a:rPr lang="en-US"/>
+              <a:pPr>
+                <a:defRPr/>
+              </a:pPr>
+              <a:t>7/6/12</a:t>
             </a:fld>
-            <a:endParaRPr lang="en-US"/>
-          </a:p>
-        </p:txBody>
-      </p:sp>
-      <p:sp>
-        <p:nvSpPr>
-          <p:cNvPr id="8" name="Footer Placeholder 7"/>
+            <a:endParaRPr lang="en-US" dirty="0"/>
+          </a:p>
+        </p:txBody>
+      </p:sp>
+      <p:sp>
+        <p:nvSpPr>
+          <p:cNvPr id="8" name="Footer Placeholder 4"/>
           <p:cNvSpPr>
             <a:spLocks noGrp="1"/>
           </p:cNvSpPr>
@@ -1766,15 +2392,22 @@
         <p:spPr/>
         <p:txBody>
           <a:bodyPr/>
-          <a:lstStyle/>
-          <a:p>
-            <a:endParaRPr lang="en-US"/>
-          </a:p>
-        </p:txBody>
-      </p:sp>
-      <p:sp>
-        <p:nvSpPr>
-          <p:cNvPr id="9" name="Slide Number Placeholder 8"/>
+          <a:lstStyle>
+            <a:lvl1pPr>
+              <a:defRPr/>
+            </a:lvl1pPr>
+          </a:lstStyle>
+          <a:p>
+            <a:pPr>
+              <a:defRPr/>
+            </a:pPr>
+            <a:endParaRPr lang="en-US" dirty="0"/>
+          </a:p>
+        </p:txBody>
+      </p:sp>
+      <p:sp>
+        <p:nvSpPr>
+          <p:cNvPr id="9" name="Slide Number Placeholder 5"/>
           <p:cNvSpPr>
             <a:spLocks noGrp="1"/>
           </p:cNvSpPr>
@@ -1785,14 +2418,23 @@
         <p:spPr/>
         <p:txBody>
           <a:bodyPr/>
-          <a:lstStyle/>
-          <a:p>
-            <a:fld id="{8683ECDB-7790-CD47-A480-1CA096506802}" type="slidenum">
-              <a:rPr lang="en-US" smtClean="0"/>
-              <a:pPr/>
+          <a:lstStyle>
+            <a:lvl1pPr>
+              <a:defRPr/>
+            </a:lvl1pPr>
+          </a:lstStyle>
+          <a:p>
+            <a:pPr>
+              <a:defRPr/>
+            </a:pPr>
+            <a:fld id="{AA45CA4C-7773-4BB3-92F9-3B1E2FCC57F3}" type="slidenum">
+              <a:rPr lang="en-US"/>
+              <a:pPr>
+                <a:defRPr/>
+              </a:pPr>
               <a:t>‹#›</a:t>
             </a:fld>
-            <a:endParaRPr lang="en-US"/>
+            <a:endParaRPr lang="en-US" dirty="0"/>
           </a:p>
         </p:txBody>
       </p:sp>
@@ -1805,7 +2447,7 @@
 </file>
 
 <file path=ppt/slideLayouts/slideLayout6.xml><?xml version="1.0" encoding="utf-8"?>
-<p:sldLayout xmlns:a="http://schemas.openxmlformats.org/drawingml/2006/main" xmlns:r="http://schemas.openxmlformats.org/officeDocument/2006/relationships" xmlns:mc="http://schemas.openxmlformats.org/markup-compatibility/2006" xmlns:mv="urn:schemas-microsoft-com:mac:vml" xmlns:p="http://schemas.openxmlformats.org/presentationml/2006/main" mc:Ignorable="mv" mc:PreserveAttributes="mv:*" type="titleOnly" preserve="1">
+<p:sldLayout xmlns:a="http://schemas.openxmlformats.org/drawingml/2006/main" xmlns:r="http://schemas.openxmlformats.org/officeDocument/2006/relationships" xmlns:p="http://schemas.openxmlformats.org/presentationml/2006/main" type="titleOnly" preserve="1">
   <p:cSld name="Title Only">
     <p:spTree>
       <p:nvGrpSpPr>
@@ -1846,7 +2488,7 @@
       </p:sp>
       <p:sp>
         <p:nvSpPr>
-          <p:cNvPr id="3" name="Date Placeholder 2"/>
+          <p:cNvPr id="3" name="Date Placeholder 3"/>
           <p:cNvSpPr>
             <a:spLocks noGrp="1"/>
           </p:cNvSpPr>
@@ -1857,20 +2499,29 @@
         <p:spPr/>
         <p:txBody>
           <a:bodyPr/>
-          <a:lstStyle/>
-          <a:p>
-            <a:fld id="{4FCECDFD-BFFC-6141-83BB-B602E64518FB}" type="datetimeFigureOut">
-              <a:rPr lang="en-US" smtClean="0"/>
-              <a:pPr/>
-              <a:t>4/19/11</a:t>
+          <a:lstStyle>
+            <a:lvl1pPr>
+              <a:defRPr/>
+            </a:lvl1pPr>
+          </a:lstStyle>
+          <a:p>
+            <a:pPr>
+              <a:defRPr/>
+            </a:pPr>
+            <a:fld id="{25C03C68-02DE-4C4E-941A-96ECF28F7C67}" type="datetimeFigureOut">
+              <a:rPr lang="en-US"/>
+              <a:pPr>
+                <a:defRPr/>
+              </a:pPr>
+              <a:t>7/6/12</a:t>
             </a:fld>
-            <a:endParaRPr lang="en-US"/>
-          </a:p>
-        </p:txBody>
-      </p:sp>
-      <p:sp>
-        <p:nvSpPr>
-          <p:cNvPr id="4" name="Footer Placeholder 3"/>
+            <a:endParaRPr lang="en-US" dirty="0"/>
+          </a:p>
+        </p:txBody>
+      </p:sp>
+      <p:sp>
+        <p:nvSpPr>
+          <p:cNvPr id="4" name="Footer Placeholder 4"/>
           <p:cNvSpPr>
             <a:spLocks noGrp="1"/>
           </p:cNvSpPr>
@@ -1881,15 +2532,22 @@
         <p:spPr/>
         <p:txBody>
           <a:bodyPr/>
-          <a:lstStyle/>
-          <a:p>
-            <a:endParaRPr lang="en-US"/>
-          </a:p>
-        </p:txBody>
-      </p:sp>
-      <p:sp>
-        <p:nvSpPr>
-          <p:cNvPr id="5" name="Slide Number Placeholder 4"/>
+          <a:lstStyle>
+            <a:lvl1pPr>
+              <a:defRPr/>
+            </a:lvl1pPr>
+          </a:lstStyle>
+          <a:p>
+            <a:pPr>
+              <a:defRPr/>
+            </a:pPr>
+            <a:endParaRPr lang="en-US" dirty="0"/>
+          </a:p>
+        </p:txBody>
+      </p:sp>
+      <p:sp>
+        <p:nvSpPr>
+          <p:cNvPr id="5" name="Slide Number Placeholder 5"/>
           <p:cNvSpPr>
             <a:spLocks noGrp="1"/>
           </p:cNvSpPr>
@@ -1900,14 +2558,23 @@
         <p:spPr/>
         <p:txBody>
           <a:bodyPr/>
-          <a:lstStyle/>
-          <a:p>
-            <a:fld id="{8683ECDB-7790-CD47-A480-1CA096506802}" type="slidenum">
-              <a:rPr lang="en-US" smtClean="0"/>
-              <a:pPr/>
+          <a:lstStyle>
+            <a:lvl1pPr>
+              <a:defRPr/>
+            </a:lvl1pPr>
+          </a:lstStyle>
+          <a:p>
+            <a:pPr>
+              <a:defRPr/>
+            </a:pPr>
+            <a:fld id="{7F04C4E5-A64F-4658-BAC7-979F6381C29E}" type="slidenum">
+              <a:rPr lang="en-US"/>
+              <a:pPr>
+                <a:defRPr/>
+              </a:pPr>
               <a:t>‹#›</a:t>
             </a:fld>
-            <a:endParaRPr lang="en-US"/>
+            <a:endParaRPr lang="en-US" dirty="0"/>
           </a:p>
         </p:txBody>
       </p:sp>
@@ -1920,7 +2587,7 @@
 </file>
 
 <file path=ppt/slideLayouts/slideLayout7.xml><?xml version="1.0" encoding="utf-8"?>
-<p:sldLayout xmlns:a="http://schemas.openxmlformats.org/drawingml/2006/main" xmlns:r="http://schemas.openxmlformats.org/officeDocument/2006/relationships" xmlns:mc="http://schemas.openxmlformats.org/markup-compatibility/2006" xmlns:mv="urn:schemas-microsoft-com:mac:vml" xmlns:p="http://schemas.openxmlformats.org/presentationml/2006/main" mc:Ignorable="mv" mc:PreserveAttributes="mv:*" type="blank" preserve="1">
+<p:sldLayout xmlns:a="http://schemas.openxmlformats.org/drawingml/2006/main" xmlns:r="http://schemas.openxmlformats.org/officeDocument/2006/relationships" xmlns:p="http://schemas.openxmlformats.org/presentationml/2006/main" type="blank" preserve="1">
   <p:cSld name="Blank">
     <p:spTree>
       <p:nvGrpSpPr>
@@ -1938,7 +2605,7 @@
       </p:grpSpPr>
       <p:sp>
         <p:nvSpPr>
-          <p:cNvPr id="2" name="Date Placeholder 1"/>
+          <p:cNvPr id="2" name="Date Placeholder 3"/>
           <p:cNvSpPr>
             <a:spLocks noGrp="1"/>
           </p:cNvSpPr>
@@ -1949,20 +2616,29 @@
         <p:spPr/>
         <p:txBody>
           <a:bodyPr/>
-          <a:lstStyle/>
-          <a:p>
-            <a:fld id="{4FCECDFD-BFFC-6141-83BB-B602E64518FB}" type="datetimeFigureOut">
-              <a:rPr lang="en-US" smtClean="0"/>
-              <a:pPr/>
-              <a:t>4/19/11</a:t>
+          <a:lstStyle>
+            <a:lvl1pPr>
+              <a:defRPr/>
+            </a:lvl1pPr>
+          </a:lstStyle>
+          <a:p>
+            <a:pPr>
+              <a:defRPr/>
+            </a:pPr>
+            <a:fld id="{D9A589FA-27C3-4FD1-B7A7-82FFAEF89949}" type="datetimeFigureOut">
+              <a:rPr lang="en-US"/>
+              <a:pPr>
+                <a:defRPr/>
+              </a:pPr>
+              <a:t>7/6/12</a:t>
             </a:fld>
-            <a:endParaRPr lang="en-US"/>
-          </a:p>
-        </p:txBody>
-      </p:sp>
-      <p:sp>
-        <p:nvSpPr>
-          <p:cNvPr id="3" name="Footer Placeholder 2"/>
+            <a:endParaRPr lang="en-US" dirty="0"/>
+          </a:p>
+        </p:txBody>
+      </p:sp>
+      <p:sp>
+        <p:nvSpPr>
+          <p:cNvPr id="3" name="Footer Placeholder 4"/>
           <p:cNvSpPr>
             <a:spLocks noGrp="1"/>
           </p:cNvSpPr>
@@ -1973,15 +2649,22 @@
         <p:spPr/>
         <p:txBody>
           <a:bodyPr/>
-          <a:lstStyle/>
-          <a:p>
-            <a:endParaRPr lang="en-US"/>
-          </a:p>
-        </p:txBody>
-      </p:sp>
-      <p:sp>
-        <p:nvSpPr>
-          <p:cNvPr id="4" name="Slide Number Placeholder 3"/>
+          <a:lstStyle>
+            <a:lvl1pPr>
+              <a:defRPr/>
+            </a:lvl1pPr>
+          </a:lstStyle>
+          <a:p>
+            <a:pPr>
+              <a:defRPr/>
+            </a:pPr>
+            <a:endParaRPr lang="en-US" dirty="0"/>
+          </a:p>
+        </p:txBody>
+      </p:sp>
+      <p:sp>
+        <p:nvSpPr>
+          <p:cNvPr id="4" name="Slide Number Placeholder 5"/>
           <p:cNvSpPr>
             <a:spLocks noGrp="1"/>
           </p:cNvSpPr>
@@ -1992,14 +2675,23 @@
         <p:spPr/>
         <p:txBody>
           <a:bodyPr/>
-          <a:lstStyle/>
-          <a:p>
-            <a:fld id="{8683ECDB-7790-CD47-A480-1CA096506802}" type="slidenum">
-              <a:rPr lang="en-US" smtClean="0"/>
-              <a:pPr/>
+          <a:lstStyle>
+            <a:lvl1pPr>
+              <a:defRPr/>
+            </a:lvl1pPr>
+          </a:lstStyle>
+          <a:p>
+            <a:pPr>
+              <a:defRPr/>
+            </a:pPr>
+            <a:fld id="{AD2585F0-FCA0-4BA4-80AD-C2DC395DB445}" type="slidenum">
+              <a:rPr lang="en-US"/>
+              <a:pPr>
+                <a:defRPr/>
+              </a:pPr>
               <a:t>‹#›</a:t>
             </a:fld>
-            <a:endParaRPr lang="en-US"/>
+            <a:endParaRPr lang="en-US" dirty="0"/>
           </a:p>
         </p:txBody>
       </p:sp>
@@ -2012,7 +2704,7 @@
 </file>
 
 <file path=ppt/slideLayouts/slideLayout8.xml><?xml version="1.0" encoding="utf-8"?>
-<p:sldLayout xmlns:a="http://schemas.openxmlformats.org/drawingml/2006/main" xmlns:r="http://schemas.openxmlformats.org/officeDocument/2006/relationships" xmlns:mc="http://schemas.openxmlformats.org/markup-compatibility/2006" xmlns:mv="urn:schemas-microsoft-com:mac:vml" xmlns:p="http://schemas.openxmlformats.org/presentationml/2006/main" mc:Ignorable="mv" mc:PreserveAttributes="mv:*" type="objTx" preserve="1">
+<p:sldLayout xmlns:a="http://schemas.openxmlformats.org/drawingml/2006/main" xmlns:r="http://schemas.openxmlformats.org/officeDocument/2006/relationships" xmlns:p="http://schemas.openxmlformats.org/presentationml/2006/main" type="objTx" preserve="1">
   <p:cSld name="Content with Caption">
     <p:spTree>
       <p:nvGrpSpPr>
@@ -2212,7 +2904,7 @@
       </p:sp>
       <p:sp>
         <p:nvSpPr>
-          <p:cNvPr id="5" name="Date Placeholder 4"/>
+          <p:cNvPr id="5" name="Date Placeholder 3"/>
           <p:cNvSpPr>
             <a:spLocks noGrp="1"/>
           </p:cNvSpPr>
@@ -2223,20 +2915,29 @@
         <p:spPr/>
         <p:txBody>
           <a:bodyPr/>
-          <a:lstStyle/>
-          <a:p>
-            <a:fld id="{4FCECDFD-BFFC-6141-83BB-B602E64518FB}" type="datetimeFigureOut">
-              <a:rPr lang="en-US" smtClean="0"/>
-              <a:pPr/>
-              <a:t>4/19/11</a:t>
+          <a:lstStyle>
+            <a:lvl1pPr>
+              <a:defRPr/>
+            </a:lvl1pPr>
+          </a:lstStyle>
+          <a:p>
+            <a:pPr>
+              <a:defRPr/>
+            </a:pPr>
+            <a:fld id="{7B5ADE40-7230-43BF-9A60-976B754BB36D}" type="datetimeFigureOut">
+              <a:rPr lang="en-US"/>
+              <a:pPr>
+                <a:defRPr/>
+              </a:pPr>
+              <a:t>7/6/12</a:t>
             </a:fld>
-            <a:endParaRPr lang="en-US"/>
-          </a:p>
-        </p:txBody>
-      </p:sp>
-      <p:sp>
-        <p:nvSpPr>
-          <p:cNvPr id="6" name="Footer Placeholder 5"/>
+            <a:endParaRPr lang="en-US" dirty="0"/>
+          </a:p>
+        </p:txBody>
+      </p:sp>
+      <p:sp>
+        <p:nvSpPr>
+          <p:cNvPr id="6" name="Footer Placeholder 4"/>
           <p:cNvSpPr>
             <a:spLocks noGrp="1"/>
           </p:cNvSpPr>
@@ -2247,15 +2948,22 @@
         <p:spPr/>
         <p:txBody>
           <a:bodyPr/>
-          <a:lstStyle/>
-          <a:p>
-            <a:endParaRPr lang="en-US"/>
-          </a:p>
-        </p:txBody>
-      </p:sp>
-      <p:sp>
-        <p:nvSpPr>
-          <p:cNvPr id="7" name="Slide Number Placeholder 6"/>
+          <a:lstStyle>
+            <a:lvl1pPr>
+              <a:defRPr/>
+            </a:lvl1pPr>
+          </a:lstStyle>
+          <a:p>
+            <a:pPr>
+              <a:defRPr/>
+            </a:pPr>
+            <a:endParaRPr lang="en-US" dirty="0"/>
+          </a:p>
+        </p:txBody>
+      </p:sp>
+      <p:sp>
+        <p:nvSpPr>
+          <p:cNvPr id="7" name="Slide Number Placeholder 5"/>
           <p:cNvSpPr>
             <a:spLocks noGrp="1"/>
           </p:cNvSpPr>
@@ -2266,14 +2974,23 @@
         <p:spPr/>
         <p:txBody>
           <a:bodyPr/>
-          <a:lstStyle/>
-          <a:p>
-            <a:fld id="{8683ECDB-7790-CD47-A480-1CA096506802}" type="slidenum">
-              <a:rPr lang="en-US" smtClean="0"/>
-              <a:pPr/>
+          <a:lstStyle>
+            <a:lvl1pPr>
+              <a:defRPr/>
+            </a:lvl1pPr>
+          </a:lstStyle>
+          <a:p>
+            <a:pPr>
+              <a:defRPr/>
+            </a:pPr>
+            <a:fld id="{26D76953-EE80-4FAF-B5CF-0E397D49EF9B}" type="slidenum">
+              <a:rPr lang="en-US"/>
+              <a:pPr>
+                <a:defRPr/>
+              </a:pPr>
               <a:t>‹#›</a:t>
             </a:fld>
-            <a:endParaRPr lang="en-US"/>
+            <a:endParaRPr lang="en-US" dirty="0"/>
           </a:p>
         </p:txBody>
       </p:sp>
@@ -2286,7 +3003,7 @@
 </file>
 
 <file path=ppt/slideLayouts/slideLayout9.xml><?xml version="1.0" encoding="utf-8"?>
-<p:sldLayout xmlns:a="http://schemas.openxmlformats.org/drawingml/2006/main" xmlns:r="http://schemas.openxmlformats.org/officeDocument/2006/relationships" xmlns:mc="http://schemas.openxmlformats.org/markup-compatibility/2006" xmlns:mv="urn:schemas-microsoft-com:mac:vml" xmlns:p="http://schemas.openxmlformats.org/presentationml/2006/main" mc:Ignorable="mv" mc:PreserveAttributes="mv:*" type="picTx" preserve="1">
+<p:sldLayout xmlns:a="http://schemas.openxmlformats.org/drawingml/2006/main" xmlns:r="http://schemas.openxmlformats.org/officeDocument/2006/relationships" xmlns:p="http://schemas.openxmlformats.org/presentationml/2006/main" type="picTx" preserve="1">
   <p:cSld name="Picture with Caption">
     <p:spTree>
       <p:nvGrpSpPr>
@@ -2351,7 +3068,9 @@
           </a:xfrm>
         </p:spPr>
         <p:txBody>
-          <a:bodyPr/>
+          <a:bodyPr rtlCol="0">
+            <a:normAutofit/>
+          </a:bodyPr>
           <a:lstStyle>
             <a:lvl1pPr marL="0" indent="0">
               <a:buNone/>
@@ -2391,7 +3110,8 @@
             </a:lvl9pPr>
           </a:lstStyle>
           <a:p>
-            <a:endParaRPr lang="en-US"/>
+            <a:pPr lvl="0"/>
+            <a:endParaRPr lang="en-US" noProof="0" dirty="0"/>
           </a:p>
         </p:txBody>
       </p:sp>
@@ -2462,7 +3182,7 @@
       </p:sp>
       <p:sp>
         <p:nvSpPr>
-          <p:cNvPr id="5" name="Date Placeholder 4"/>
+          <p:cNvPr id="5" name="Date Placeholder 3"/>
           <p:cNvSpPr>
             <a:spLocks noGrp="1"/>
           </p:cNvSpPr>
@@ -2473,20 +3193,29 @@
         <p:spPr/>
         <p:txBody>
           <a:bodyPr/>
-          <a:lstStyle/>
-          <a:p>
-            <a:fld id="{4FCECDFD-BFFC-6141-83BB-B602E64518FB}" type="datetimeFigureOut">
-              <a:rPr lang="en-US" smtClean="0"/>
-              <a:pPr/>
-              <a:t>4/19/11</a:t>
+          <a:lstStyle>
+            <a:lvl1pPr>
+              <a:defRPr/>
+            </a:lvl1pPr>
+          </a:lstStyle>
+          <a:p>
+            <a:pPr>
+              <a:defRPr/>
+            </a:pPr>
+            <a:fld id="{FEFFC9D6-420E-4A04-BCC6-71D068D97AFE}" type="datetimeFigureOut">
+              <a:rPr lang="en-US"/>
+              <a:pPr>
+                <a:defRPr/>
+              </a:pPr>
+              <a:t>7/6/12</a:t>
             </a:fld>
-            <a:endParaRPr lang="en-US"/>
-          </a:p>
-        </p:txBody>
-      </p:sp>
-      <p:sp>
-        <p:nvSpPr>
-          <p:cNvPr id="6" name="Footer Placeholder 5"/>
+            <a:endParaRPr lang="en-US" dirty="0"/>
+          </a:p>
+        </p:txBody>
+      </p:sp>
+      <p:sp>
+        <p:nvSpPr>
+          <p:cNvPr id="6" name="Footer Placeholder 4"/>
           <p:cNvSpPr>
             <a:spLocks noGrp="1"/>
           </p:cNvSpPr>
@@ -2497,15 +3226,22 @@
         <p:spPr/>
         <p:txBody>
           <a:bodyPr/>
-          <a:lstStyle/>
-          <a:p>
-            <a:endParaRPr lang="en-US"/>
-          </a:p>
-        </p:txBody>
-      </p:sp>
-      <p:sp>
-        <p:nvSpPr>
-          <p:cNvPr id="7" name="Slide Number Placeholder 6"/>
+          <a:lstStyle>
+            <a:lvl1pPr>
+              <a:defRPr/>
+            </a:lvl1pPr>
+          </a:lstStyle>
+          <a:p>
+            <a:pPr>
+              <a:defRPr/>
+            </a:pPr>
+            <a:endParaRPr lang="en-US" dirty="0"/>
+          </a:p>
+        </p:txBody>
+      </p:sp>
+      <p:sp>
+        <p:nvSpPr>
+          <p:cNvPr id="7" name="Slide Number Placeholder 5"/>
           <p:cNvSpPr>
             <a:spLocks noGrp="1"/>
           </p:cNvSpPr>
@@ -2516,14 +3252,23 @@
         <p:spPr/>
         <p:txBody>
           <a:bodyPr/>
-          <a:lstStyle/>
-          <a:p>
-            <a:fld id="{8683ECDB-7790-CD47-A480-1CA096506802}" type="slidenum">
-              <a:rPr lang="en-US" smtClean="0"/>
-              <a:pPr/>
+          <a:lstStyle>
+            <a:lvl1pPr>
+              <a:defRPr/>
+            </a:lvl1pPr>
+          </a:lstStyle>
+          <a:p>
+            <a:pPr>
+              <a:defRPr/>
+            </a:pPr>
+            <a:fld id="{5E817595-02ED-404B-B6B7-34656E1A59B0}" type="slidenum">
+              <a:rPr lang="en-US"/>
+              <a:pPr>
+                <a:defRPr/>
+              </a:pPr>
               <a:t>‹#›</a:t>
             </a:fld>
-            <a:endParaRPr lang="en-US"/>
+            <a:endParaRPr lang="en-US" dirty="0"/>
           </a:p>
         </p:txBody>
       </p:sp>
@@ -2536,7 +3281,7 @@
 </file>
 
 <file path=ppt/slideMasters/slideMaster1.xml><?xml version="1.0" encoding="utf-8"?>
-<p:sldMaster xmlns:a="http://schemas.openxmlformats.org/drawingml/2006/main" xmlns:r="http://schemas.openxmlformats.org/officeDocument/2006/relationships" xmlns:mc="http://schemas.openxmlformats.org/markup-compatibility/2006" xmlns:mv="urn:schemas-microsoft-com:mac:vml" xmlns:p="http://schemas.openxmlformats.org/presentationml/2006/main" mc:Ignorable="mv" mc:PreserveAttributes="mv:*">
+<p:sldMaster xmlns:a="http://schemas.openxmlformats.org/drawingml/2006/main" xmlns:r="http://schemas.openxmlformats.org/officeDocument/2006/relationships" xmlns:p="http://schemas.openxmlformats.org/presentationml/2006/main">
   <p:cSld>
     <p:bg>
       <p:bgRef idx="1001">
@@ -2559,7 +3304,7 @@
       </p:grpSpPr>
       <p:sp>
         <p:nvSpPr>
-          <p:cNvPr id="2" name="Title Placeholder 1"/>
+          <p:cNvPr id="1026" name="Title Placeholder 1"/>
           <p:cNvSpPr>
             <a:spLocks noGrp="1"/>
           </p:cNvSpPr>
@@ -2567,7 +3312,7 @@
             <p:ph type="title"/>
           </p:nvPr>
         </p:nvSpPr>
-        <p:spPr>
+        <p:spPr bwMode="auto">
           <a:xfrm>
             <a:off x="457200" y="274638"/>
             <a:ext cx="8229600" cy="1143000"/>
@@ -2575,24 +3320,33 @@
           <a:prstGeom prst="rect">
             <a:avLst/>
           </a:prstGeom>
+          <a:noFill/>
+          <a:ln w="9525">
+            <a:noFill/>
+            <a:miter lim="800000"/>
+            <a:headEnd/>
+            <a:tailEnd/>
+          </a:ln>
         </p:spPr>
         <p:txBody>
-          <a:bodyPr vert="horz" lIns="91440" tIns="45720" rIns="91440" bIns="45720" rtlCol="0" anchor="ctr">
-            <a:normAutofit/>
+          <a:bodyPr vert="horz" wrap="square" lIns="91440" tIns="45720" rIns="91440" bIns="45720" numCol="1" anchor="ctr" anchorCtr="0" compatLnSpc="1">
+            <a:prstTxWarp prst="textNoShape">
+              <a:avLst/>
+            </a:prstTxWarp>
           </a:bodyPr>
           <a:lstStyle/>
           <a:p>
+            <a:pPr lvl="0"/>
             <a:r>
               <a:rPr lang="en-US" smtClean="0"/>
               <a:t>Click to edit Master title style</a:t>
             </a:r>
-            <a:endParaRPr lang="en-US"/>
-          </a:p>
-        </p:txBody>
-      </p:sp>
-      <p:sp>
-        <p:nvSpPr>
-          <p:cNvPr id="3" name="Text Placeholder 2"/>
+          </a:p>
+        </p:txBody>
+      </p:sp>
+      <p:sp>
+        <p:nvSpPr>
+          <p:cNvPr id="1027" name="Text Placeholder 2"/>
           <p:cNvSpPr>
             <a:spLocks noGrp="1"/>
           </p:cNvSpPr>
@@ -2600,7 +3354,7 @@
             <p:ph type="body" idx="1"/>
           </p:nvPr>
         </p:nvSpPr>
-        <p:spPr>
+        <p:spPr bwMode="auto">
           <a:xfrm>
             <a:off x="457200" y="1600200"/>
             <a:ext cx="8229600" cy="4525963"/>
@@ -2608,10 +3362,19 @@
           <a:prstGeom prst="rect">
             <a:avLst/>
           </a:prstGeom>
+          <a:noFill/>
+          <a:ln w="9525">
+            <a:noFill/>
+            <a:miter lim="800000"/>
+            <a:headEnd/>
+            <a:tailEnd/>
+          </a:ln>
         </p:spPr>
         <p:txBody>
-          <a:bodyPr vert="horz" lIns="91440" tIns="45720" rIns="91440" bIns="45720" rtlCol="0">
-            <a:normAutofit/>
+          <a:bodyPr vert="horz" wrap="square" lIns="91440" tIns="45720" rIns="91440" bIns="45720" numCol="1" anchor="t" anchorCtr="0" compatLnSpc="1">
+            <a:prstTxWarp prst="textNoShape">
+              <a:avLst/>
+            </a:prstTxWarp>
           </a:bodyPr>
           <a:lstStyle/>
           <a:p>
@@ -2648,7 +3411,6 @@
               <a:rPr lang="en-US" smtClean="0"/>
               <a:t>Fifth level</a:t>
             </a:r>
-            <a:endParaRPr lang="en-US"/>
           </a:p>
         </p:txBody>
       </p:sp>
@@ -2674,23 +3436,36 @@
         <p:txBody>
           <a:bodyPr vert="horz" lIns="91440" tIns="45720" rIns="91440" bIns="45720" rtlCol="0" anchor="ctr"/>
           <a:lstStyle>
-            <a:lvl1pPr algn="l">
-              <a:defRPr sz="1200">
+            <a:lvl1pPr algn="l" fontAlgn="auto">
+              <a:spcBef>
+                <a:spcPts val="0"/>
+              </a:spcBef>
+              <a:spcAft>
+                <a:spcPts val="0"/>
+              </a:spcAft>
+              <a:defRPr sz="1200" smtClean="0">
                 <a:solidFill>
                   <a:schemeClr val="tx1">
                     <a:tint val="75000"/>
                   </a:schemeClr>
                 </a:solidFill>
+                <a:latin typeface="+mn-lt"/>
+                <a:cs typeface="+mn-cs"/>
               </a:defRPr>
             </a:lvl1pPr>
           </a:lstStyle>
           <a:p>
-            <a:fld id="{4FCECDFD-BFFC-6141-83BB-B602E64518FB}" type="datetimeFigureOut">
-              <a:rPr lang="en-US" smtClean="0"/>
-              <a:pPr/>
-              <a:t>4/19/11</a:t>
+            <a:pPr>
+              <a:defRPr/>
+            </a:pPr>
+            <a:fld id="{53920EE2-9CA1-4F3F-9FD5-0673D5D0DB53}" type="datetimeFigureOut">
+              <a:rPr lang="en-US"/>
+              <a:pPr>
+                <a:defRPr/>
+              </a:pPr>
+              <a:t>7/6/12</a:t>
             </a:fld>
-            <a:endParaRPr lang="en-US"/>
+            <a:endParaRPr lang="en-US" dirty="0"/>
           </a:p>
         </p:txBody>
       </p:sp>
@@ -2716,18 +3491,29 @@
         <p:txBody>
           <a:bodyPr vert="horz" lIns="91440" tIns="45720" rIns="91440" bIns="45720" rtlCol="0" anchor="ctr"/>
           <a:lstStyle>
-            <a:lvl1pPr algn="ctr">
+            <a:lvl1pPr algn="ctr" fontAlgn="auto">
+              <a:spcBef>
+                <a:spcPts val="0"/>
+              </a:spcBef>
+              <a:spcAft>
+                <a:spcPts val="0"/>
+              </a:spcAft>
               <a:defRPr sz="1200">
                 <a:solidFill>
                   <a:schemeClr val="tx1">
                     <a:tint val="75000"/>
                   </a:schemeClr>
                 </a:solidFill>
+                <a:latin typeface="+mn-lt"/>
+                <a:cs typeface="+mn-cs"/>
               </a:defRPr>
             </a:lvl1pPr>
           </a:lstStyle>
           <a:p>
-            <a:endParaRPr lang="en-US"/>
+            <a:pPr>
+              <a:defRPr/>
+            </a:pPr>
+            <a:endParaRPr lang="en-US" dirty="0"/>
           </a:p>
         </p:txBody>
       </p:sp>
@@ -2753,23 +3539,36 @@
         <p:txBody>
           <a:bodyPr vert="horz" lIns="91440" tIns="45720" rIns="91440" bIns="45720" rtlCol="0" anchor="ctr"/>
           <a:lstStyle>
-            <a:lvl1pPr algn="r">
-              <a:defRPr sz="1200">
+            <a:lvl1pPr algn="r" fontAlgn="auto">
+              <a:spcBef>
+                <a:spcPts val="0"/>
+              </a:spcBef>
+              <a:spcAft>
+                <a:spcPts val="0"/>
+              </a:spcAft>
+              <a:defRPr sz="1200" smtClean="0">
                 <a:solidFill>
                   <a:schemeClr val="tx1">
                     <a:tint val="75000"/>
                   </a:schemeClr>
                 </a:solidFill>
+                <a:latin typeface="+mn-lt"/>
+                <a:cs typeface="+mn-cs"/>
               </a:defRPr>
             </a:lvl1pPr>
           </a:lstStyle>
           <a:p>
-            <a:fld id="{8683ECDB-7790-CD47-A480-1CA096506802}" type="slidenum">
-              <a:rPr lang="en-US" smtClean="0"/>
-              <a:pPr/>
+            <a:pPr>
+              <a:defRPr/>
+            </a:pPr>
+            <a:fld id="{ABFE99C4-9921-4EC1-B89D-4BB7C5D58CB9}" type="slidenum">
+              <a:rPr lang="en-US"/>
+              <a:pPr>
+                <a:defRPr/>
+              </a:pPr>
               <a:t>‹#›</a:t>
             </a:fld>
-            <a:endParaRPr lang="en-US"/>
+            <a:endParaRPr lang="en-US" dirty="0"/>
           </a:p>
         </p:txBody>
       </p:sp>
@@ -2777,25 +3576,27 @@
   </p:cSld>
   <p:clrMap bg1="lt1" tx1="dk1" bg2="lt2" tx2="dk2" accent1="accent1" accent2="accent2" accent3="accent3" accent4="accent4" accent5="accent5" accent6="accent6" hlink="hlink" folHlink="folHlink"/>
   <p:sldLayoutIdLst>
-    <p:sldLayoutId id="2147483649" r:id="rId1"/>
-    <p:sldLayoutId id="2147483650" r:id="rId2"/>
-    <p:sldLayoutId id="2147483651" r:id="rId3"/>
-    <p:sldLayoutId id="2147483652" r:id="rId4"/>
-    <p:sldLayoutId id="2147483653" r:id="rId5"/>
+    <p:sldLayoutId id="2147483659" r:id="rId1"/>
+    <p:sldLayoutId id="2147483658" r:id="rId2"/>
+    <p:sldLayoutId id="2147483657" r:id="rId3"/>
+    <p:sldLayoutId id="2147483656" r:id="rId4"/>
+    <p:sldLayoutId id="2147483655" r:id="rId5"/>
     <p:sldLayoutId id="2147483654" r:id="rId6"/>
-    <p:sldLayoutId id="2147483655" r:id="rId7"/>
-    <p:sldLayoutId id="2147483656" r:id="rId8"/>
-    <p:sldLayoutId id="2147483657" r:id="rId9"/>
-    <p:sldLayoutId id="2147483658" r:id="rId10"/>
-    <p:sldLayoutId id="2147483659" r:id="rId11"/>
+    <p:sldLayoutId id="2147483653" r:id="rId7"/>
+    <p:sldLayoutId id="2147483652" r:id="rId8"/>
+    <p:sldLayoutId id="2147483651" r:id="rId9"/>
+    <p:sldLayoutId id="2147483650" r:id="rId10"/>
+    <p:sldLayoutId id="2147483649" r:id="rId11"/>
   </p:sldLayoutIdLst>
   <p:txStyles>
     <p:titleStyle>
-      <a:lvl1pPr algn="ctr" defTabSz="457200" rtl="0" eaLnBrk="1" latinLnBrk="0" hangingPunct="1">
+      <a:lvl1pPr algn="ctr" defTabSz="457200" rtl="0" fontAlgn="base">
         <a:spcBef>
           <a:spcPct val="0"/>
         </a:spcBef>
-        <a:buNone/>
+        <a:spcAft>
+          <a:spcPct val="0"/>
+        </a:spcAft>
         <a:defRPr sz="4400" kern="1200">
           <a:solidFill>
             <a:schemeClr val="tx1"/>
@@ -2805,13 +3606,128 @@
           <a:cs typeface="+mj-cs"/>
         </a:defRPr>
       </a:lvl1pPr>
+      <a:lvl2pPr algn="ctr" defTabSz="457200" rtl="0" fontAlgn="base">
+        <a:spcBef>
+          <a:spcPct val="0"/>
+        </a:spcBef>
+        <a:spcAft>
+          <a:spcPct val="0"/>
+        </a:spcAft>
+        <a:defRPr sz="4400">
+          <a:solidFill>
+            <a:schemeClr val="tx1"/>
+          </a:solidFill>
+          <a:latin typeface="Calibri" pitchFamily="34" charset="0"/>
+        </a:defRPr>
+      </a:lvl2pPr>
+      <a:lvl3pPr algn="ctr" defTabSz="457200" rtl="0" fontAlgn="base">
+        <a:spcBef>
+          <a:spcPct val="0"/>
+        </a:spcBef>
+        <a:spcAft>
+          <a:spcPct val="0"/>
+        </a:spcAft>
+        <a:defRPr sz="4400">
+          <a:solidFill>
+            <a:schemeClr val="tx1"/>
+          </a:solidFill>
+          <a:latin typeface="Calibri" pitchFamily="34" charset="0"/>
+        </a:defRPr>
+      </a:lvl3pPr>
+      <a:lvl4pPr algn="ctr" defTabSz="457200" rtl="0" fontAlgn="base">
+        <a:spcBef>
+          <a:spcPct val="0"/>
+        </a:spcBef>
+        <a:spcAft>
+          <a:spcPct val="0"/>
+        </a:spcAft>
+        <a:defRPr sz="4400">
+          <a:solidFill>
+            <a:schemeClr val="tx1"/>
+          </a:solidFill>
+          <a:latin typeface="Calibri" pitchFamily="34" charset="0"/>
+        </a:defRPr>
+      </a:lvl4pPr>
+      <a:lvl5pPr algn="ctr" defTabSz="457200" rtl="0" fontAlgn="base">
+        <a:spcBef>
+          <a:spcPct val="0"/>
+        </a:spcBef>
+        <a:spcAft>
+          <a:spcPct val="0"/>
+        </a:spcAft>
+        <a:defRPr sz="4400">
+          <a:solidFill>
+            <a:schemeClr val="tx1"/>
+          </a:solidFill>
+          <a:latin typeface="Calibri" pitchFamily="34" charset="0"/>
+        </a:defRPr>
+      </a:lvl5pPr>
+      <a:lvl6pPr marL="457200" algn="ctr" defTabSz="457200" rtl="0" fontAlgn="base">
+        <a:spcBef>
+          <a:spcPct val="0"/>
+        </a:spcBef>
+        <a:spcAft>
+          <a:spcPct val="0"/>
+        </a:spcAft>
+        <a:defRPr sz="4400">
+          <a:solidFill>
+            <a:schemeClr val="tx1"/>
+          </a:solidFill>
+          <a:latin typeface="Calibri" pitchFamily="34" charset="0"/>
+        </a:defRPr>
+      </a:lvl6pPr>
+      <a:lvl7pPr marL="914400" algn="ctr" defTabSz="457200" rtl="0" fontAlgn="base">
+        <a:spcBef>
+          <a:spcPct val="0"/>
+        </a:spcBef>
+        <a:spcAft>
+          <a:spcPct val="0"/>
+        </a:spcAft>
+        <a:defRPr sz="4400">
+          <a:solidFill>
+            <a:schemeClr val="tx1"/>
+          </a:solidFill>
+          <a:latin typeface="Calibri" pitchFamily="34" charset="0"/>
+        </a:defRPr>
+      </a:lvl7pPr>
+      <a:lvl8pPr marL="1371600" algn="ctr" defTabSz="457200" rtl="0" fontAlgn="base">
+        <a:spcBef>
+          <a:spcPct val="0"/>
+        </a:spcBef>
+        <a:spcAft>
+          <a:spcPct val="0"/>
+        </a:spcAft>
+        <a:defRPr sz="4400">
+          <a:solidFill>
+            <a:schemeClr val="tx1"/>
+          </a:solidFill>
+          <a:latin typeface="Calibri" pitchFamily="34" charset="0"/>
+        </a:defRPr>
+      </a:lvl8pPr>
+      <a:lvl9pPr marL="1828800" algn="ctr" defTabSz="457200" rtl="0" fontAlgn="base">
+        <a:spcBef>
+          <a:spcPct val="0"/>
+        </a:spcBef>
+        <a:spcAft>
+          <a:spcPct val="0"/>
+        </a:spcAft>
+        <a:defRPr sz="4400">
+          <a:solidFill>
+            <a:schemeClr val="tx1"/>
+          </a:solidFill>
+          <a:latin typeface="Calibri" pitchFamily="34" charset="0"/>
+        </a:defRPr>
+      </a:lvl9pPr>
     </p:titleStyle>
     <p:bodyStyle>
-      <a:lvl1pPr marL="342900" indent="-342900" algn="l" defTabSz="457200" rtl="0" eaLnBrk="1" latinLnBrk="0" hangingPunct="1">
+      <a:lvl1pPr marL="342900" indent="-342900" algn="l" defTabSz="457200" rtl="0" fontAlgn="base">
         <a:spcBef>
           <a:spcPct val="20000"/>
         </a:spcBef>
-        <a:buFont typeface="Arial"/>
+        <a:spcAft>
+          <a:spcPct val="0"/>
+        </a:spcAft>
+        <a:buFont typeface="Arial" charset="0"/>
         <a:buChar char="•"/>
         <a:defRPr sz="3200" kern="1200">
           <a:solidFill>
@@ -2822,11 +3738,14 @@
           <a:cs typeface="+mn-cs"/>
         </a:defRPr>
       </a:lvl1pPr>
-      <a:lvl2pPr marL="742950" indent="-285750" algn="l" defTabSz="457200" rtl="0" eaLnBrk="1" latinLnBrk="0" hangingPunct="1">
+      <a:lvl2pPr marL="742950" indent="-285750" algn="l" defTabSz="457200" rtl="0" fontAlgn="base">
         <a:spcBef>
           <a:spcPct val="20000"/>
         </a:spcBef>
-        <a:buFont typeface="Arial"/>
+        <a:spcAft>
+          <a:spcPct val="0"/>
+        </a:spcAft>
+        <a:buFont typeface="Arial" charset="0"/>
         <a:buChar char="–"/>
         <a:defRPr sz="2800" kern="1200">
           <a:solidFill>
@@ -2837,11 +3756,14 @@
           <a:cs typeface="+mn-cs"/>
         </a:defRPr>
       </a:lvl2pPr>
-      <a:lvl3pPr marL="1143000" indent="-228600" algn="l" defTabSz="457200" rtl="0" eaLnBrk="1" latinLnBrk="0" hangingPunct="1">
+      <a:lvl3pPr marL="1143000" indent="-228600" algn="l" defTabSz="457200" rtl="0" fontAlgn="base">
         <a:spcBef>
           <a:spcPct val="20000"/>
         </a:spcBef>
-        <a:buFont typeface="Arial"/>
+        <a:spcAft>
+          <a:spcPct val="0"/>
+        </a:spcAft>
+        <a:buFont typeface="Arial" charset="0"/>
         <a:buChar char="•"/>
         <a:defRPr sz="2400" kern="1200">
           <a:solidFill>
@@ -2852,11 +3774,14 @@
           <a:cs typeface="+mn-cs"/>
         </a:defRPr>
       </a:lvl3pPr>
-      <a:lvl4pPr marL="1600200" indent="-228600" algn="l" defTabSz="457200" rtl="0" eaLnBrk="1" latinLnBrk="0" hangingPunct="1">
+      <a:lvl4pPr marL="1600200" indent="-228600" algn="l" defTabSz="457200" rtl="0" fontAlgn="base">
         <a:spcBef>
           <a:spcPct val="20000"/>
         </a:spcBef>
-        <a:buFont typeface="Arial"/>
+        <a:spcAft>
+          <a:spcPct val="0"/>
+        </a:spcAft>
+        <a:buFont typeface="Arial" charset="0"/>
         <a:buChar char="–"/>
         <a:defRPr sz="2000" kern="1200">
           <a:solidFill>
@@ -2867,11 +3792,14 @@
           <a:cs typeface="+mn-cs"/>
         </a:defRPr>
       </a:lvl4pPr>
-      <a:lvl5pPr marL="2057400" indent="-228600" algn="l" defTabSz="457200" rtl="0" eaLnBrk="1" latinLnBrk="0" hangingPunct="1">
+      <a:lvl5pPr marL="2057400" indent="-228600" algn="l" defTabSz="457200" rtl="0" fontAlgn="base">
         <a:spcBef>
           <a:spcPct val="20000"/>
         </a:spcBef>
-        <a:buFont typeface="Arial"/>
+        <a:spcAft>
+          <a:spcPct val="0"/>
+        </a:spcAft>
+        <a:buFont typeface="Arial" charset="0"/>
         <a:buChar char="»"/>
         <a:defRPr sz="2000" kern="1200">
           <a:solidFill>
@@ -3043,7 +3971,7 @@
 </file>
 
 <file path=ppt/slides/slide1.xml><?xml version="1.0" encoding="utf-8"?>
-<p:sld xmlns:a="http://schemas.openxmlformats.org/drawingml/2006/main" xmlns:r="http://schemas.openxmlformats.org/officeDocument/2006/relationships" xmlns:mc="http://schemas.openxmlformats.org/markup-compatibility/2006" xmlns:mv="urn:schemas-microsoft-com:mac:vml" xmlns:p="http://schemas.openxmlformats.org/presentationml/2006/main" mc:Ignorable="mv" mc:PreserveAttributes="mv:*">
+<p:sld xmlns:a="http://schemas.openxmlformats.org/drawingml/2006/main" xmlns:r="http://schemas.openxmlformats.org/officeDocument/2006/relationships" xmlns:p="http://schemas.openxmlformats.org/presentationml/2006/main">
   <p:cSld>
     <p:spTree>
       <p:nvGrpSpPr>
@@ -3067,8 +3995,8 @@
         </p:nvSpPr>
         <p:spPr>
           <a:xfrm>
-            <a:off x="1956971" y="1415534"/>
-            <a:ext cx="2133600" cy="609600"/>
+            <a:off x="152400" y="764659"/>
+            <a:ext cx="2133600" cy="612648"/>
           </a:xfrm>
           <a:prstGeom prst="rect">
             <a:avLst/>
@@ -3099,11 +4027,396 @@
           </a:fontRef>
         </p:style>
         <p:txBody>
-          <a:bodyPr rtlCol="0" anchor="ctr"/>
+          <a:bodyPr anchor="ctr">
+            <a:spAutoFit/>
+          </a:bodyPr>
           <a:lstStyle/>
           <a:p>
-            <a:pPr algn="ctr"/>
-            <a:endParaRPr lang="en-US"/>
+            <a:pPr algn="ctr" fontAlgn="auto">
+              <a:spcBef>
+                <a:spcPts val="0"/>
+              </a:spcBef>
+              <a:spcAft>
+                <a:spcPts val="0"/>
+              </a:spcAft>
+              <a:defRPr/>
+            </a:pPr>
+            <a:endParaRPr lang="en-US" dirty="0"/>
+          </a:p>
+        </p:txBody>
+      </p:sp>
+      <p:cxnSp>
+        <p:nvCxnSpPr>
+          <p:cNvPr id="17" name="Shape 16"/>
+          <p:cNvCxnSpPr>
+            <a:endCxn id="6" idx="1"/>
+          </p:cNvCxnSpPr>
+          <p:nvPr/>
+        </p:nvCxnSpPr>
+        <p:spPr>
+          <a:xfrm rot="16200000" flipH="1">
+            <a:off x="350813" y="1628847"/>
+            <a:ext cx="755172" cy="236536"/>
+          </a:xfrm>
+          <a:prstGeom prst="bentConnector2">
+            <a:avLst/>
+          </a:prstGeom>
+          <a:ln>
+            <a:solidFill>
+              <a:schemeClr val="tx1"/>
+            </a:solidFill>
+            <a:tailEnd type="arrow"/>
+          </a:ln>
+        </p:spPr>
+        <p:style>
+          <a:lnRef idx="2">
+            <a:schemeClr val="accent1"/>
+          </a:lnRef>
+          <a:fillRef idx="0">
+            <a:schemeClr val="accent1"/>
+          </a:fillRef>
+          <a:effectRef idx="1">
+            <a:schemeClr val="accent1"/>
+          </a:effectRef>
+          <a:fontRef idx="minor">
+            <a:schemeClr val="tx1"/>
+          </a:fontRef>
+        </p:style>
+      </p:cxnSp>
+      <p:sp>
+        <p:nvSpPr>
+          <p:cNvPr id="27" name="Rectangle 26"/>
+          <p:cNvSpPr/>
+          <p:nvPr/>
+        </p:nvSpPr>
+        <p:spPr>
+          <a:xfrm>
+            <a:off x="5562600" y="6346825"/>
+            <a:ext cx="2133600" cy="609600"/>
+          </a:xfrm>
+          <a:prstGeom prst="rect">
+            <a:avLst/>
+          </a:prstGeom>
+          <a:noFill/>
+          <a:ln>
+            <a:noFill/>
+          </a:ln>
+        </p:spPr>
+        <p:style>
+          <a:lnRef idx="1">
+            <a:schemeClr val="accent1"/>
+          </a:lnRef>
+          <a:fillRef idx="3">
+            <a:schemeClr val="accent1"/>
+          </a:fillRef>
+          <a:effectRef idx="2">
+            <a:schemeClr val="accent1"/>
+          </a:effectRef>
+          <a:fontRef idx="minor">
+            <a:schemeClr val="lt1"/>
+          </a:fontRef>
+        </p:style>
+        <p:txBody>
+          <a:bodyPr anchor="ctr"/>
+          <a:lstStyle/>
+          <a:p>
+            <a:pPr algn="ctr" fontAlgn="auto">
+              <a:spcBef>
+                <a:spcPts val="0"/>
+              </a:spcBef>
+              <a:spcAft>
+                <a:spcPts val="0"/>
+              </a:spcAft>
+              <a:defRPr/>
+            </a:pPr>
+            <a:endParaRPr lang="en-US" dirty="0"/>
+          </a:p>
+        </p:txBody>
+      </p:sp>
+      <p:sp>
+        <p:nvSpPr>
+          <p:cNvPr id="13323" name="TextBox 30"/>
+          <p:cNvSpPr txBox="1">
+            <a:spLocks noChangeArrowheads="1"/>
+          </p:cNvSpPr>
+          <p:nvPr/>
+        </p:nvSpPr>
+        <p:spPr bwMode="auto">
+          <a:xfrm>
+            <a:off x="58330" y="400243"/>
+            <a:ext cx="1011853" cy="369332"/>
+          </a:xfrm>
+          <a:prstGeom prst="rect">
+            <a:avLst/>
+          </a:prstGeom>
+          <a:noFill/>
+          <a:ln w="9525">
+            <a:noFill/>
+            <a:miter lim="800000"/>
+            <a:headEnd/>
+            <a:tailEnd/>
+          </a:ln>
+        </p:spPr>
+        <p:txBody>
+          <a:bodyPr wrap="none">
+            <a:spAutoFit/>
+          </a:bodyPr>
+          <a:lstStyle/>
+          <a:p>
+            <a:r>
+              <a:rPr lang="en-US" dirty="0" smtClean="0">
+                <a:latin typeface="Calibri" pitchFamily="34" charset="0"/>
+              </a:rPr>
+              <a:t>ArrayList</a:t>
+            </a:r>
+            <a:endParaRPr lang="en-US" dirty="0">
+              <a:latin typeface="Calibri" pitchFamily="34" charset="0"/>
+            </a:endParaRPr>
+          </a:p>
+        </p:txBody>
+      </p:sp>
+      <p:sp>
+        <p:nvSpPr>
+          <p:cNvPr id="13327" name="Rectangle 34"/>
+          <p:cNvSpPr>
+            <a:spLocks noChangeArrowheads="1"/>
+          </p:cNvSpPr>
+          <p:nvPr/>
+        </p:nvSpPr>
+        <p:spPr bwMode="auto">
+          <a:xfrm>
+            <a:off x="2295408" y="577785"/>
+            <a:ext cx="2590799" cy="369332"/>
+          </a:xfrm>
+          <a:prstGeom prst="rect">
+            <a:avLst/>
+          </a:prstGeom>
+          <a:noFill/>
+          <a:ln w="9525">
+            <a:noFill/>
+            <a:miter lim="800000"/>
+            <a:headEnd/>
+            <a:tailEnd/>
+          </a:ln>
+        </p:spPr>
+        <p:txBody>
+          <a:bodyPr wrap="square">
+            <a:noAutofit/>
+          </a:bodyPr>
+          <a:lstStyle/>
+          <a:p>
+            <a:r>
+              <a:rPr lang="en-US" i="1" dirty="0">
+                <a:latin typeface="Calibri" pitchFamily="34" charset="0"/>
+              </a:rPr>
+              <a:t> </a:t>
+            </a:r>
+            <a:r>
+              <a:rPr lang="en-US" i="1" dirty="0">
+                <a:latin typeface="Calibri" pitchFamily="34" charset="0"/>
+              </a:rPr>
+              <a:t>W</a:t>
+            </a:r>
+            <a:r>
+              <a:rPr lang="en-US" i="1" dirty="0" smtClean="0">
+                <a:latin typeface="Calibri" pitchFamily="34" charset="0"/>
+              </a:rPr>
+              <a:t>rapper: 24 </a:t>
+            </a:r>
+            <a:r>
+              <a:rPr lang="en-US" i="1" dirty="0">
+                <a:latin typeface="Calibri" pitchFamily="34" charset="0"/>
+              </a:rPr>
+              <a:t>bytes</a:t>
+            </a:r>
+          </a:p>
+        </p:txBody>
+      </p:sp>
+      <p:sp>
+        <p:nvSpPr>
+          <p:cNvPr id="13330" name="Rectangle 19"/>
+          <p:cNvSpPr>
+            <a:spLocks noChangeArrowheads="1"/>
+          </p:cNvSpPr>
+          <p:nvPr/>
+        </p:nvSpPr>
+        <p:spPr bwMode="auto">
+          <a:xfrm>
+            <a:off x="1668639" y="3997246"/>
+            <a:ext cx="2309512" cy="369332"/>
+          </a:xfrm>
+          <a:prstGeom prst="rect">
+            <a:avLst/>
+          </a:prstGeom>
+          <a:noFill/>
+          <a:ln w="9525">
+            <a:noFill/>
+            <a:miter lim="800000"/>
+            <a:headEnd/>
+            <a:tailEnd/>
+          </a:ln>
+        </p:spPr>
+        <p:txBody>
+          <a:bodyPr wrap="square">
+            <a:spAutoFit/>
+          </a:bodyPr>
+          <a:lstStyle/>
+          <a:p>
+            <a:r>
+              <a:rPr lang="en-US" i="1" dirty="0" smtClean="0">
+                <a:latin typeface="Calibri" pitchFamily="34" charset="0"/>
+              </a:rPr>
+              <a:t>1 4-byte slot </a:t>
+            </a:r>
+            <a:r>
+              <a:rPr lang="en-US" i="1" dirty="0">
+                <a:latin typeface="Calibri" pitchFamily="34" charset="0"/>
+              </a:rPr>
+              <a:t>per entry</a:t>
+            </a:r>
+          </a:p>
+        </p:txBody>
+      </p:sp>
+      <p:cxnSp>
+        <p:nvCxnSpPr>
+          <p:cNvPr id="22" name="Shape 21"/>
+          <p:cNvCxnSpPr>
+            <a:cxnSpLocks noChangeShapeType="1"/>
+            <a:stCxn id="24" idx="3"/>
+            <a:endCxn id="13396" idx="1"/>
+          </p:cNvCxnSpPr>
+          <p:nvPr/>
+        </p:nvCxnSpPr>
+        <p:spPr bwMode="auto">
+          <a:xfrm flipV="1">
+            <a:off x="1459443" y="2550931"/>
+            <a:ext cx="494375" cy="808"/>
+          </a:xfrm>
+          <a:prstGeom prst="bentConnector3">
+            <a:avLst>
+              <a:gd name="adj1" fmla="val 50000"/>
+            </a:avLst>
+          </a:prstGeom>
+          <a:noFill/>
+          <a:ln w="25400" algn="ctr">
+            <a:solidFill>
+              <a:schemeClr val="tx1"/>
+            </a:solidFill>
+            <a:miter lim="800000"/>
+            <a:headEnd/>
+            <a:tailEnd type="arrow" w="med" len="med"/>
+          </a:ln>
+          <a:effectLst>
+            <a:outerShdw dist="20000" dir="5400000" rotWithShape="0">
+              <a:srgbClr val="000000">
+                <a:alpha val="37999"/>
+              </a:srgbClr>
+            </a:outerShdw>
+          </a:effectLst>
+        </p:spPr>
+      </p:cxnSp>
+      <p:sp>
+        <p:nvSpPr>
+          <p:cNvPr id="13325" name="TextBox 32"/>
+          <p:cNvSpPr txBox="1">
+            <a:spLocks noChangeArrowheads="1"/>
+          </p:cNvSpPr>
+          <p:nvPr/>
+        </p:nvSpPr>
+        <p:spPr bwMode="auto">
+          <a:xfrm>
+            <a:off x="754421" y="1405643"/>
+            <a:ext cx="945353" cy="369332"/>
+          </a:xfrm>
+          <a:prstGeom prst="rect">
+            <a:avLst/>
+          </a:prstGeom>
+          <a:noFill/>
+          <a:ln w="9525">
+            <a:noFill/>
+            <a:miter lim="800000"/>
+            <a:headEnd/>
+            <a:tailEnd/>
+          </a:ln>
+        </p:spPr>
+        <p:txBody>
+          <a:bodyPr wrap="none">
+            <a:spAutoFit/>
+          </a:bodyPr>
+          <a:lstStyle/>
+          <a:p>
+            <a:r>
+              <a:rPr lang="en-US" dirty="0" smtClean="0">
+                <a:latin typeface="Calibri" pitchFamily="34" charset="0"/>
+              </a:rPr>
+              <a:t>Object[]</a:t>
+            </a:r>
+            <a:endParaRPr lang="en-US" dirty="0">
+              <a:latin typeface="Calibri" pitchFamily="34" charset="0"/>
+            </a:endParaRPr>
+          </a:p>
+        </p:txBody>
+      </p:sp>
+      <p:sp>
+        <p:nvSpPr>
+          <p:cNvPr id="13329" name="Rectangle 37"/>
+          <p:cNvSpPr>
+            <a:spLocks noChangeArrowheads="1"/>
+          </p:cNvSpPr>
+          <p:nvPr/>
+        </p:nvSpPr>
+        <p:spPr bwMode="auto">
+          <a:xfrm>
+            <a:off x="1474391" y="1651873"/>
+            <a:ext cx="3595026" cy="369332"/>
+          </a:xfrm>
+          <a:prstGeom prst="rect">
+            <a:avLst/>
+          </a:prstGeom>
+          <a:noFill/>
+          <a:ln w="9525">
+            <a:noFill/>
+            <a:miter lim="800000"/>
+            <a:headEnd/>
+            <a:tailEnd/>
+          </a:ln>
+        </p:spPr>
+        <p:txBody>
+          <a:bodyPr wrap="square">
+            <a:spAutoFit/>
+          </a:bodyPr>
+          <a:lstStyle/>
+          <a:p>
+            <a:r>
+              <a:rPr lang="en-US" i="1" dirty="0">
+                <a:latin typeface="Calibri" pitchFamily="34" charset="0"/>
+              </a:rPr>
+              <a:t>D</a:t>
+            </a:r>
+            <a:r>
+              <a:rPr lang="en-US" i="1" dirty="0" smtClean="0">
+                <a:latin typeface="Calibri" pitchFamily="34" charset="0"/>
+              </a:rPr>
+              <a:t>efault </a:t>
+            </a:r>
+            <a:r>
+              <a:rPr lang="en-US" i="1" dirty="0" smtClean="0">
+                <a:latin typeface="Calibri" pitchFamily="34" charset="0"/>
+              </a:rPr>
+              <a:t>capacity </a:t>
+            </a:r>
+            <a:r>
+              <a:rPr lang="en-US" i="1" dirty="0" smtClean="0">
+                <a:latin typeface="Calibri" pitchFamily="34" charset="0"/>
+              </a:rPr>
+              <a:t>10 slots: 56 </a:t>
+            </a:r>
+            <a:r>
+              <a:rPr lang="en-US" i="1" dirty="0">
+                <a:latin typeface="Calibri" pitchFamily="34" charset="0"/>
+              </a:rPr>
+              <a:t>bytes</a:t>
+            </a:r>
           </a:p>
         </p:txBody>
       </p:sp>
@@ -3115,8 +4428,8 @@
         </p:nvSpPr>
         <p:spPr>
           <a:xfrm>
-            <a:off x="3480971" y="2634734"/>
-            <a:ext cx="2133600" cy="609600"/>
+            <a:off x="846667" y="1770592"/>
+            <a:ext cx="612775" cy="708218"/>
           </a:xfrm>
           <a:prstGeom prst="rect">
             <a:avLst/>
@@ -3147,29 +4460,41 @@
           </a:fontRef>
         </p:style>
         <p:txBody>
-          <a:bodyPr rtlCol="0" anchor="ctr"/>
+          <a:bodyPr anchor="ctr"/>
           <a:lstStyle/>
           <a:p>
-            <a:pPr algn="ctr"/>
-            <a:endParaRPr lang="en-US"/>
-          </a:p>
-        </p:txBody>
-      </p:sp>
-      <p:sp>
-        <p:nvSpPr>
-          <p:cNvPr id="7" name="Rectangle 6"/>
+            <a:pPr algn="ctr" fontAlgn="auto">
+              <a:spcBef>
+                <a:spcPts val="0"/>
+              </a:spcBef>
+              <a:spcAft>
+                <a:spcPts val="0"/>
+              </a:spcAft>
+              <a:defRPr/>
+            </a:pPr>
+            <a:endParaRPr lang="en-US" dirty="0"/>
+          </a:p>
+        </p:txBody>
+      </p:sp>
+      <p:sp>
+        <p:nvSpPr>
+          <p:cNvPr id="24" name="Rectangle 5"/>
           <p:cNvSpPr/>
           <p:nvPr/>
         </p:nvSpPr>
         <p:spPr>
           <a:xfrm>
-            <a:off x="5004971" y="3853934"/>
-            <a:ext cx="2133600" cy="609600"/>
+            <a:off x="846668" y="2478810"/>
+            <a:ext cx="612775" cy="145857"/>
           </a:xfrm>
           <a:prstGeom prst="rect">
             <a:avLst/>
           </a:prstGeom>
-          <a:noFill/>
+          <a:solidFill>
+            <a:schemeClr val="bg1">
+              <a:lumMod val="85000"/>
+            </a:schemeClr>
+          </a:solidFill>
           <a:ln>
             <a:solidFill>
               <a:schemeClr val="tx1"/>
@@ -3191,108 +4516,84 @@
           </a:fontRef>
         </p:style>
         <p:txBody>
-          <a:bodyPr rtlCol="0" anchor="ctr"/>
+          <a:bodyPr anchor="ctr"/>
           <a:lstStyle/>
           <a:p>
-            <a:pPr algn="ctr"/>
-            <a:endParaRPr lang="en-US"/>
-          </a:p>
-        </p:txBody>
-      </p:sp>
-      <p:cxnSp>
-        <p:nvCxnSpPr>
-          <p:cNvPr id="17" name="Shape 16"/>
-          <p:cNvCxnSpPr>
-            <a:stCxn id="5" idx="2"/>
-          </p:cNvCxnSpPr>
+            <a:pPr algn="ctr" fontAlgn="auto">
+              <a:spcBef>
+                <a:spcPts val="0"/>
+              </a:spcBef>
+              <a:spcAft>
+                <a:spcPts val="0"/>
+              </a:spcAft>
+              <a:defRPr/>
+            </a:pPr>
+            <a:endParaRPr lang="en-US" dirty="0"/>
+          </a:p>
+        </p:txBody>
+      </p:sp>
+      <p:sp>
+        <p:nvSpPr>
+          <p:cNvPr id="13396" name="TextBox 32"/>
+          <p:cNvSpPr txBox="1">
+            <a:spLocks noChangeArrowheads="1"/>
+          </p:cNvSpPr>
           <p:nvPr/>
-        </p:nvCxnSpPr>
-        <p:spPr>
-          <a:xfrm rot="16200000" flipH="1">
-            <a:off x="2795171" y="2253734"/>
-            <a:ext cx="914400" cy="457200"/>
-          </a:xfrm>
-          <a:prstGeom prst="bentConnector2">
-            <a:avLst/>
-          </a:prstGeom>
-          <a:ln>
-            <a:solidFill>
-              <a:schemeClr val="tx1"/>
-            </a:solidFill>
-            <a:tailEnd type="arrow"/>
-          </a:ln>
-        </p:spPr>
-        <p:style>
-          <a:lnRef idx="2">
-            <a:schemeClr val="accent1"/>
-          </a:lnRef>
-          <a:fillRef idx="0">
-            <a:schemeClr val="accent1"/>
-          </a:fillRef>
-          <a:effectRef idx="1">
-            <a:schemeClr val="accent1"/>
-          </a:effectRef>
-          <a:fontRef idx="minor">
-            <a:schemeClr val="tx1"/>
-          </a:fontRef>
-        </p:style>
-      </p:cxnSp>
-      <p:cxnSp>
-        <p:nvCxnSpPr>
-          <p:cNvPr id="22" name="Shape 21"/>
-          <p:cNvCxnSpPr>
-            <a:stCxn id="6" idx="2"/>
-            <a:endCxn id="7" idx="1"/>
-          </p:cNvCxnSpPr>
-          <p:nvPr/>
-        </p:nvCxnSpPr>
-        <p:spPr>
-          <a:xfrm rot="16200000" flipH="1">
-            <a:off x="4319171" y="3472934"/>
-            <a:ext cx="914400" cy="457200"/>
-          </a:xfrm>
-          <a:prstGeom prst="bentConnector2">
-            <a:avLst/>
-          </a:prstGeom>
-          <a:ln>
-            <a:solidFill>
-              <a:schemeClr val="tx1"/>
-            </a:solidFill>
-            <a:tailEnd type="arrow"/>
-          </a:ln>
-        </p:spPr>
-        <p:style>
-          <a:lnRef idx="2">
-            <a:schemeClr val="accent1"/>
-          </a:lnRef>
-          <a:fillRef idx="0">
-            <a:schemeClr val="accent1"/>
-          </a:fillRef>
-          <a:effectRef idx="1">
-            <a:schemeClr val="accent1"/>
-          </a:effectRef>
-          <a:fontRef idx="minor">
-            <a:schemeClr val="tx1"/>
-          </a:fontRef>
-        </p:style>
-      </p:cxnSp>
-      <p:sp>
-        <p:nvSpPr>
-          <p:cNvPr id="27" name="Rectangle 26"/>
-          <p:cNvSpPr/>
-          <p:nvPr/>
-        </p:nvSpPr>
-        <p:spPr>
+        </p:nvSpPr>
+        <p:spPr bwMode="auto">
           <a:xfrm>
-            <a:off x="5004971" y="4920734"/>
-            <a:ext cx="2133600" cy="609600"/>
+            <a:off x="1953818" y="2367575"/>
+            <a:ext cx="1055687" cy="366712"/>
           </a:xfrm>
           <a:prstGeom prst="rect">
             <a:avLst/>
           </a:prstGeom>
           <a:noFill/>
+          <a:ln w="9525">
+            <a:noFill/>
+            <a:miter lim="800000"/>
+            <a:headEnd/>
+            <a:tailEnd/>
+          </a:ln>
+        </p:spPr>
+        <p:txBody>
+          <a:bodyPr wrap="none">
+            <a:spAutoFit/>
+          </a:bodyPr>
+          <a:lstStyle/>
+          <a:p>
+            <a:r>
+              <a:rPr lang="en-US" dirty="0">
+                <a:latin typeface="Calibri" pitchFamily="34" charset="0"/>
+              </a:rPr>
+              <a:t>user data</a:t>
+            </a:r>
+          </a:p>
+        </p:txBody>
+      </p:sp>
+      <p:sp>
+        <p:nvSpPr>
+          <p:cNvPr id="79" name="Rectangle 5"/>
+          <p:cNvSpPr/>
+          <p:nvPr/>
+        </p:nvSpPr>
+        <p:spPr>
+          <a:xfrm>
+            <a:off x="843492" y="2631210"/>
+            <a:ext cx="612775" cy="145857"/>
+          </a:xfrm>
+          <a:prstGeom prst="rect">
+            <a:avLst/>
+          </a:prstGeom>
+          <a:solidFill>
+            <a:schemeClr val="bg1">
+              <a:lumMod val="85000"/>
+            </a:schemeClr>
+          </a:solidFill>
           <a:ln>
-            <a:noFill/>
+            <a:solidFill>
+              <a:schemeClr val="tx1"/>
+            </a:solidFill>
           </a:ln>
         </p:spPr>
         <p:style>
@@ -3310,249 +4611,966 @@
           </a:fontRef>
         </p:style>
         <p:txBody>
-          <a:bodyPr rtlCol="0" anchor="ctr"/>
+          <a:bodyPr anchor="ctr"/>
           <a:lstStyle/>
           <a:p>
-            <a:pPr algn="ctr"/>
-            <a:endParaRPr lang="en-US"/>
-          </a:p>
-        </p:txBody>
-      </p:sp>
-      <p:cxnSp>
-        <p:nvCxnSpPr>
-          <p:cNvPr id="29" name="Shape 28"/>
-          <p:cNvCxnSpPr>
-            <a:stCxn id="6" idx="2"/>
-            <a:endCxn id="27" idx="1"/>
-          </p:cNvCxnSpPr>
+            <a:pPr algn="ctr" fontAlgn="auto">
+              <a:spcBef>
+                <a:spcPts val="0"/>
+              </a:spcBef>
+              <a:spcAft>
+                <a:spcPts val="0"/>
+              </a:spcAft>
+              <a:defRPr/>
+            </a:pPr>
+            <a:endParaRPr lang="en-US" dirty="0"/>
+          </a:p>
+        </p:txBody>
+      </p:sp>
+      <p:sp>
+        <p:nvSpPr>
+          <p:cNvPr id="80" name="Rectangle 5"/>
+          <p:cNvSpPr/>
           <p:nvPr/>
-        </p:nvCxnSpPr>
+        </p:nvSpPr>
         <p:spPr>
-          <a:xfrm rot="16200000" flipH="1">
-            <a:off x="3785771" y="4006334"/>
-            <a:ext cx="1981200" cy="457200"/>
+          <a:xfrm>
+            <a:off x="843492" y="2777067"/>
+            <a:ext cx="612775" cy="145857"/>
           </a:xfrm>
-          <a:prstGeom prst="bentConnector2">
+          <a:prstGeom prst="rect">
             <a:avLst/>
           </a:prstGeom>
+          <a:solidFill>
+            <a:schemeClr val="bg1">
+              <a:lumMod val="85000"/>
+            </a:schemeClr>
+          </a:solidFill>
           <a:ln>
             <a:solidFill>
               <a:schemeClr val="tx1"/>
             </a:solidFill>
-            <a:tailEnd type="arrow"/>
           </a:ln>
         </p:spPr>
         <p:style>
-          <a:lnRef idx="2">
+          <a:lnRef idx="1">
             <a:schemeClr val="accent1"/>
           </a:lnRef>
-          <a:fillRef idx="0">
+          <a:fillRef idx="3">
             <a:schemeClr val="accent1"/>
           </a:fillRef>
-          <a:effectRef idx="1">
+          <a:effectRef idx="2">
             <a:schemeClr val="accent1"/>
           </a:effectRef>
           <a:fontRef idx="minor">
-            <a:schemeClr val="tx1"/>
+            <a:schemeClr val="lt1"/>
           </a:fontRef>
         </p:style>
-      </p:cxnSp>
-      <p:sp>
-        <p:nvSpPr>
-          <p:cNvPr id="30" name="TextBox 29"/>
-          <p:cNvSpPr txBox="1"/>
+        <p:txBody>
+          <a:bodyPr anchor="ctr"/>
+          <a:lstStyle/>
+          <a:p>
+            <a:pPr algn="ctr" fontAlgn="auto">
+              <a:spcBef>
+                <a:spcPts val="0"/>
+              </a:spcBef>
+              <a:spcAft>
+                <a:spcPts val="0"/>
+              </a:spcAft>
+              <a:defRPr/>
+            </a:pPr>
+            <a:endParaRPr lang="en-US" dirty="0"/>
+          </a:p>
+        </p:txBody>
+      </p:sp>
+      <p:sp>
+        <p:nvSpPr>
+          <p:cNvPr id="81" name="Rectangle 5"/>
+          <p:cNvSpPr/>
           <p:nvPr/>
         </p:nvSpPr>
         <p:spPr>
           <a:xfrm>
-            <a:off x="5330554" y="4810035"/>
-            <a:ext cx="568034" cy="461665"/>
+            <a:off x="846667" y="2931210"/>
+            <a:ext cx="612775" cy="145857"/>
+          </a:xfrm>
+          <a:prstGeom prst="rect">
+            <a:avLst/>
+          </a:prstGeom>
+          <a:solidFill>
+            <a:schemeClr val="bg1">
+              <a:lumMod val="85000"/>
+            </a:schemeClr>
+          </a:solidFill>
+          <a:ln>
+            <a:solidFill>
+              <a:schemeClr val="tx1"/>
+            </a:solidFill>
+          </a:ln>
+        </p:spPr>
+        <p:style>
+          <a:lnRef idx="1">
+            <a:schemeClr val="accent1"/>
+          </a:lnRef>
+          <a:fillRef idx="3">
+            <a:schemeClr val="accent1"/>
+          </a:fillRef>
+          <a:effectRef idx="2">
+            <a:schemeClr val="accent1"/>
+          </a:effectRef>
+          <a:fontRef idx="minor">
+            <a:schemeClr val="lt1"/>
+          </a:fontRef>
+        </p:style>
+        <p:txBody>
+          <a:bodyPr anchor="ctr"/>
+          <a:lstStyle/>
+          <a:p>
+            <a:pPr algn="ctr" fontAlgn="auto">
+              <a:spcBef>
+                <a:spcPts val="0"/>
+              </a:spcBef>
+              <a:spcAft>
+                <a:spcPts val="0"/>
+              </a:spcAft>
+              <a:defRPr/>
+            </a:pPr>
+            <a:endParaRPr lang="en-US" dirty="0"/>
+          </a:p>
+        </p:txBody>
+      </p:sp>
+      <p:sp>
+        <p:nvSpPr>
+          <p:cNvPr id="83" name="Rectangle 5"/>
+          <p:cNvSpPr/>
+          <p:nvPr/>
+        </p:nvSpPr>
+        <p:spPr>
+          <a:xfrm>
+            <a:off x="846668" y="3081867"/>
+            <a:ext cx="612775" cy="145857"/>
+          </a:xfrm>
+          <a:prstGeom prst="rect">
+            <a:avLst/>
+          </a:prstGeom>
+          <a:solidFill>
+            <a:schemeClr val="bg1">
+              <a:lumMod val="85000"/>
+            </a:schemeClr>
+          </a:solidFill>
+          <a:ln>
+            <a:solidFill>
+              <a:schemeClr val="tx1"/>
+            </a:solidFill>
+          </a:ln>
+        </p:spPr>
+        <p:style>
+          <a:lnRef idx="1">
+            <a:schemeClr val="accent1"/>
+          </a:lnRef>
+          <a:fillRef idx="3">
+            <a:schemeClr val="accent1"/>
+          </a:fillRef>
+          <a:effectRef idx="2">
+            <a:schemeClr val="accent1"/>
+          </a:effectRef>
+          <a:fontRef idx="minor">
+            <a:schemeClr val="lt1"/>
+          </a:fontRef>
+        </p:style>
+        <p:txBody>
+          <a:bodyPr anchor="ctr"/>
+          <a:lstStyle/>
+          <a:p>
+            <a:pPr algn="ctr" fontAlgn="auto">
+              <a:spcBef>
+                <a:spcPts val="0"/>
+              </a:spcBef>
+              <a:spcAft>
+                <a:spcPts val="0"/>
+              </a:spcAft>
+              <a:defRPr/>
+            </a:pPr>
+            <a:endParaRPr lang="en-US" dirty="0"/>
+          </a:p>
+        </p:txBody>
+      </p:sp>
+      <p:sp>
+        <p:nvSpPr>
+          <p:cNvPr id="84" name="Rectangle 5"/>
+          <p:cNvSpPr/>
+          <p:nvPr/>
+        </p:nvSpPr>
+        <p:spPr>
+          <a:xfrm>
+            <a:off x="846667" y="3227724"/>
+            <a:ext cx="612775" cy="145857"/>
+          </a:xfrm>
+          <a:prstGeom prst="rect">
+            <a:avLst/>
+          </a:prstGeom>
+          <a:solidFill>
+            <a:schemeClr val="bg1">
+              <a:lumMod val="85000"/>
+            </a:schemeClr>
+          </a:solidFill>
+          <a:ln>
+            <a:solidFill>
+              <a:schemeClr val="tx1"/>
+            </a:solidFill>
+          </a:ln>
+        </p:spPr>
+        <p:style>
+          <a:lnRef idx="1">
+            <a:schemeClr val="accent1"/>
+          </a:lnRef>
+          <a:fillRef idx="3">
+            <a:schemeClr val="accent1"/>
+          </a:fillRef>
+          <a:effectRef idx="2">
+            <a:schemeClr val="accent1"/>
+          </a:effectRef>
+          <a:fontRef idx="minor">
+            <a:schemeClr val="lt1"/>
+          </a:fontRef>
+        </p:style>
+        <p:txBody>
+          <a:bodyPr anchor="ctr"/>
+          <a:lstStyle/>
+          <a:p>
+            <a:pPr algn="ctr" fontAlgn="auto">
+              <a:spcBef>
+                <a:spcPts val="0"/>
+              </a:spcBef>
+              <a:spcAft>
+                <a:spcPts val="0"/>
+              </a:spcAft>
+              <a:defRPr/>
+            </a:pPr>
+            <a:endParaRPr lang="en-US" dirty="0"/>
+          </a:p>
+        </p:txBody>
+      </p:sp>
+      <p:sp>
+        <p:nvSpPr>
+          <p:cNvPr id="85" name="Rectangle 5"/>
+          <p:cNvSpPr/>
+          <p:nvPr/>
+        </p:nvSpPr>
+        <p:spPr>
+          <a:xfrm>
+            <a:off x="846667" y="3373581"/>
+            <a:ext cx="612775" cy="145857"/>
+          </a:xfrm>
+          <a:prstGeom prst="rect">
+            <a:avLst/>
+          </a:prstGeom>
+          <a:solidFill>
+            <a:schemeClr val="bg1">
+              <a:lumMod val="85000"/>
+            </a:schemeClr>
+          </a:solidFill>
+          <a:ln>
+            <a:solidFill>
+              <a:schemeClr val="tx1"/>
+            </a:solidFill>
+          </a:ln>
+        </p:spPr>
+        <p:style>
+          <a:lnRef idx="1">
+            <a:schemeClr val="accent1"/>
+          </a:lnRef>
+          <a:fillRef idx="3">
+            <a:schemeClr val="accent1"/>
+          </a:fillRef>
+          <a:effectRef idx="2">
+            <a:schemeClr val="accent1"/>
+          </a:effectRef>
+          <a:fontRef idx="minor">
+            <a:schemeClr val="lt1"/>
+          </a:fontRef>
+        </p:style>
+        <p:txBody>
+          <a:bodyPr anchor="ctr"/>
+          <a:lstStyle/>
+          <a:p>
+            <a:pPr algn="ctr" fontAlgn="auto">
+              <a:spcBef>
+                <a:spcPts val="0"/>
+              </a:spcBef>
+              <a:spcAft>
+                <a:spcPts val="0"/>
+              </a:spcAft>
+              <a:defRPr/>
+            </a:pPr>
+            <a:endParaRPr lang="en-US" dirty="0"/>
+          </a:p>
+        </p:txBody>
+      </p:sp>
+      <p:sp>
+        <p:nvSpPr>
+          <p:cNvPr id="86" name="Rectangle 5"/>
+          <p:cNvSpPr/>
+          <p:nvPr/>
+        </p:nvSpPr>
+        <p:spPr>
+          <a:xfrm>
+            <a:off x="843492" y="3519438"/>
+            <a:ext cx="612775" cy="145857"/>
+          </a:xfrm>
+          <a:prstGeom prst="rect">
+            <a:avLst/>
+          </a:prstGeom>
+          <a:solidFill>
+            <a:schemeClr val="bg1">
+              <a:lumMod val="85000"/>
+            </a:schemeClr>
+          </a:solidFill>
+          <a:ln>
+            <a:solidFill>
+              <a:schemeClr val="tx1"/>
+            </a:solidFill>
+          </a:ln>
+        </p:spPr>
+        <p:style>
+          <a:lnRef idx="1">
+            <a:schemeClr val="accent1"/>
+          </a:lnRef>
+          <a:fillRef idx="3">
+            <a:schemeClr val="accent1"/>
+          </a:fillRef>
+          <a:effectRef idx="2">
+            <a:schemeClr val="accent1"/>
+          </a:effectRef>
+          <a:fontRef idx="minor">
+            <a:schemeClr val="lt1"/>
+          </a:fontRef>
+        </p:style>
+        <p:txBody>
+          <a:bodyPr anchor="ctr"/>
+          <a:lstStyle/>
+          <a:p>
+            <a:pPr algn="ctr" fontAlgn="auto">
+              <a:spcBef>
+                <a:spcPts val="0"/>
+              </a:spcBef>
+              <a:spcAft>
+                <a:spcPts val="0"/>
+              </a:spcAft>
+              <a:defRPr/>
+            </a:pPr>
+            <a:endParaRPr lang="en-US" dirty="0"/>
+          </a:p>
+        </p:txBody>
+      </p:sp>
+      <p:sp>
+        <p:nvSpPr>
+          <p:cNvPr id="87" name="Rectangle 5"/>
+          <p:cNvSpPr/>
+          <p:nvPr/>
+        </p:nvSpPr>
+        <p:spPr>
+          <a:xfrm>
+            <a:off x="843492" y="3665295"/>
+            <a:ext cx="612775" cy="145857"/>
+          </a:xfrm>
+          <a:prstGeom prst="rect">
+            <a:avLst/>
+          </a:prstGeom>
+          <a:solidFill>
+            <a:schemeClr val="bg1">
+              <a:lumMod val="85000"/>
+            </a:schemeClr>
+          </a:solidFill>
+          <a:ln>
+            <a:solidFill>
+              <a:schemeClr val="tx1"/>
+            </a:solidFill>
+          </a:ln>
+        </p:spPr>
+        <p:style>
+          <a:lnRef idx="1">
+            <a:schemeClr val="accent1"/>
+          </a:lnRef>
+          <a:fillRef idx="3">
+            <a:schemeClr val="accent1"/>
+          </a:fillRef>
+          <a:effectRef idx="2">
+            <a:schemeClr val="accent1"/>
+          </a:effectRef>
+          <a:fontRef idx="minor">
+            <a:schemeClr val="lt1"/>
+          </a:fontRef>
+        </p:style>
+        <p:txBody>
+          <a:bodyPr anchor="ctr"/>
+          <a:lstStyle/>
+          <a:p>
+            <a:pPr algn="ctr" fontAlgn="auto">
+              <a:spcBef>
+                <a:spcPts val="0"/>
+              </a:spcBef>
+              <a:spcAft>
+                <a:spcPts val="0"/>
+              </a:spcAft>
+              <a:defRPr/>
+            </a:pPr>
+            <a:endParaRPr lang="en-US" dirty="0"/>
+          </a:p>
+        </p:txBody>
+      </p:sp>
+      <p:sp>
+        <p:nvSpPr>
+          <p:cNvPr id="88" name="Rectangle 5"/>
+          <p:cNvSpPr/>
+          <p:nvPr/>
+        </p:nvSpPr>
+        <p:spPr>
+          <a:xfrm>
+            <a:off x="843492" y="3811152"/>
+            <a:ext cx="612775" cy="145857"/>
+          </a:xfrm>
+          <a:prstGeom prst="rect">
+            <a:avLst/>
+          </a:prstGeom>
+          <a:solidFill>
+            <a:schemeClr val="bg1">
+              <a:lumMod val="85000"/>
+            </a:schemeClr>
+          </a:solidFill>
+          <a:ln>
+            <a:solidFill>
+              <a:schemeClr val="tx1"/>
+            </a:solidFill>
+          </a:ln>
+        </p:spPr>
+        <p:style>
+          <a:lnRef idx="1">
+            <a:schemeClr val="accent1"/>
+          </a:lnRef>
+          <a:fillRef idx="3">
+            <a:schemeClr val="accent1"/>
+          </a:fillRef>
+          <a:effectRef idx="2">
+            <a:schemeClr val="accent1"/>
+          </a:effectRef>
+          <a:fontRef idx="minor">
+            <a:schemeClr val="lt1"/>
+          </a:fontRef>
+        </p:style>
+        <p:txBody>
+          <a:bodyPr anchor="ctr"/>
+          <a:lstStyle/>
+          <a:p>
+            <a:pPr algn="ctr" fontAlgn="auto">
+              <a:spcBef>
+                <a:spcPts val="0"/>
+              </a:spcBef>
+              <a:spcAft>
+                <a:spcPts val="0"/>
+              </a:spcAft>
+              <a:defRPr/>
+            </a:pPr>
+            <a:endParaRPr lang="en-US" dirty="0"/>
+          </a:p>
+        </p:txBody>
+      </p:sp>
+      <p:sp>
+        <p:nvSpPr>
+          <p:cNvPr id="90" name="Rectangle 5"/>
+          <p:cNvSpPr/>
+          <p:nvPr/>
+        </p:nvSpPr>
+        <p:spPr>
+          <a:xfrm>
+            <a:off x="843492" y="3965974"/>
+            <a:ext cx="612775" cy="145857"/>
+          </a:xfrm>
+          <a:prstGeom prst="rect">
+            <a:avLst/>
+          </a:prstGeom>
+          <a:solidFill>
+            <a:schemeClr val="bg1">
+              <a:lumMod val="85000"/>
+            </a:schemeClr>
+          </a:solidFill>
+          <a:ln>
+            <a:solidFill>
+              <a:schemeClr val="tx1"/>
+            </a:solidFill>
+          </a:ln>
+        </p:spPr>
+        <p:style>
+          <a:lnRef idx="1">
+            <a:schemeClr val="accent1"/>
+          </a:lnRef>
+          <a:fillRef idx="3">
+            <a:schemeClr val="accent1"/>
+          </a:fillRef>
+          <a:effectRef idx="2">
+            <a:schemeClr val="accent1"/>
+          </a:effectRef>
+          <a:fontRef idx="minor">
+            <a:schemeClr val="lt1"/>
+          </a:fontRef>
+        </p:style>
+        <p:txBody>
+          <a:bodyPr anchor="ctr"/>
+          <a:lstStyle/>
+          <a:p>
+            <a:pPr algn="ctr" fontAlgn="auto">
+              <a:spcBef>
+                <a:spcPts val="0"/>
+              </a:spcBef>
+              <a:spcAft>
+                <a:spcPts val="0"/>
+              </a:spcAft>
+              <a:defRPr/>
+            </a:pPr>
+            <a:endParaRPr lang="en-US" dirty="0"/>
+          </a:p>
+        </p:txBody>
+      </p:sp>
+      <p:sp>
+        <p:nvSpPr>
+          <p:cNvPr id="91" name="Rectangle 5"/>
+          <p:cNvSpPr/>
+          <p:nvPr/>
+        </p:nvSpPr>
+        <p:spPr>
+          <a:xfrm>
+            <a:off x="843492" y="4111831"/>
+            <a:ext cx="612775" cy="145857"/>
+          </a:xfrm>
+          <a:prstGeom prst="rect">
+            <a:avLst/>
+          </a:prstGeom>
+          <a:solidFill>
+            <a:schemeClr val="bg1">
+              <a:lumMod val="85000"/>
+            </a:schemeClr>
+          </a:solidFill>
+          <a:ln>
+            <a:solidFill>
+              <a:schemeClr val="tx1"/>
+            </a:solidFill>
+          </a:ln>
+        </p:spPr>
+        <p:style>
+          <a:lnRef idx="1">
+            <a:schemeClr val="accent1"/>
+          </a:lnRef>
+          <a:fillRef idx="3">
+            <a:schemeClr val="accent1"/>
+          </a:fillRef>
+          <a:effectRef idx="2">
+            <a:schemeClr val="accent1"/>
+          </a:effectRef>
+          <a:fontRef idx="minor">
+            <a:schemeClr val="lt1"/>
+          </a:fontRef>
+        </p:style>
+        <p:txBody>
+          <a:bodyPr anchor="ctr"/>
+          <a:lstStyle/>
+          <a:p>
+            <a:pPr algn="ctr" fontAlgn="auto">
+              <a:spcBef>
+                <a:spcPts val="0"/>
+              </a:spcBef>
+              <a:spcAft>
+                <a:spcPts val="0"/>
+              </a:spcAft>
+              <a:defRPr/>
+            </a:pPr>
+            <a:endParaRPr lang="en-US" dirty="0"/>
+          </a:p>
+        </p:txBody>
+      </p:sp>
+      <p:sp>
+        <p:nvSpPr>
+          <p:cNvPr id="92" name="Rectangle 5"/>
+          <p:cNvSpPr/>
+          <p:nvPr/>
+        </p:nvSpPr>
+        <p:spPr>
+          <a:xfrm>
+            <a:off x="843492" y="4257688"/>
+            <a:ext cx="612775" cy="145857"/>
+          </a:xfrm>
+          <a:prstGeom prst="rect">
+            <a:avLst/>
+          </a:prstGeom>
+          <a:solidFill>
+            <a:schemeClr val="bg1">
+              <a:lumMod val="85000"/>
+            </a:schemeClr>
+          </a:solidFill>
+          <a:ln>
+            <a:solidFill>
+              <a:schemeClr val="tx1"/>
+            </a:solidFill>
+          </a:ln>
+        </p:spPr>
+        <p:style>
+          <a:lnRef idx="1">
+            <a:schemeClr val="accent1"/>
+          </a:lnRef>
+          <a:fillRef idx="3">
+            <a:schemeClr val="accent1"/>
+          </a:fillRef>
+          <a:effectRef idx="2">
+            <a:schemeClr val="accent1"/>
+          </a:effectRef>
+          <a:fontRef idx="minor">
+            <a:schemeClr val="lt1"/>
+          </a:fontRef>
+        </p:style>
+        <p:txBody>
+          <a:bodyPr anchor="ctr"/>
+          <a:lstStyle/>
+          <a:p>
+            <a:pPr algn="ctr" fontAlgn="auto">
+              <a:spcBef>
+                <a:spcPts val="0"/>
+              </a:spcBef>
+              <a:spcAft>
+                <a:spcPts val="0"/>
+              </a:spcAft>
+              <a:defRPr/>
+            </a:pPr>
+            <a:endParaRPr lang="en-US" dirty="0"/>
+          </a:p>
+        </p:txBody>
+      </p:sp>
+      <p:sp>
+        <p:nvSpPr>
+          <p:cNvPr id="93" name="Rectangle 5"/>
+          <p:cNvSpPr/>
+          <p:nvPr/>
+        </p:nvSpPr>
+        <p:spPr>
+          <a:xfrm>
+            <a:off x="843492" y="4403545"/>
+            <a:ext cx="612775" cy="145857"/>
+          </a:xfrm>
+          <a:prstGeom prst="rect">
+            <a:avLst/>
+          </a:prstGeom>
+          <a:solidFill>
+            <a:schemeClr val="bg1">
+              <a:lumMod val="85000"/>
+            </a:schemeClr>
+          </a:solidFill>
+          <a:ln>
+            <a:solidFill>
+              <a:schemeClr val="tx1"/>
+            </a:solidFill>
+          </a:ln>
+        </p:spPr>
+        <p:style>
+          <a:lnRef idx="1">
+            <a:schemeClr val="accent1"/>
+          </a:lnRef>
+          <a:fillRef idx="3">
+            <a:schemeClr val="accent1"/>
+          </a:fillRef>
+          <a:effectRef idx="2">
+            <a:schemeClr val="accent1"/>
+          </a:effectRef>
+          <a:fontRef idx="minor">
+            <a:schemeClr val="lt1"/>
+          </a:fontRef>
+        </p:style>
+        <p:txBody>
+          <a:bodyPr anchor="ctr"/>
+          <a:lstStyle/>
+          <a:p>
+            <a:pPr algn="ctr" fontAlgn="auto">
+              <a:spcBef>
+                <a:spcPts val="0"/>
+              </a:spcBef>
+              <a:spcAft>
+                <a:spcPts val="0"/>
+              </a:spcAft>
+              <a:defRPr/>
+            </a:pPr>
+            <a:endParaRPr lang="en-US" dirty="0"/>
+          </a:p>
+        </p:txBody>
+      </p:sp>
+      <p:sp>
+        <p:nvSpPr>
+          <p:cNvPr id="94" name="Rectangle 5"/>
+          <p:cNvSpPr/>
+          <p:nvPr/>
+        </p:nvSpPr>
+        <p:spPr>
+          <a:xfrm>
+            <a:off x="843492" y="4549402"/>
+            <a:ext cx="612775" cy="145857"/>
+          </a:xfrm>
+          <a:prstGeom prst="rect">
+            <a:avLst/>
+          </a:prstGeom>
+          <a:solidFill>
+            <a:schemeClr val="bg1">
+              <a:lumMod val="85000"/>
+            </a:schemeClr>
+          </a:solidFill>
+          <a:ln>
+            <a:solidFill>
+              <a:schemeClr val="tx1"/>
+            </a:solidFill>
+          </a:ln>
+        </p:spPr>
+        <p:style>
+          <a:lnRef idx="1">
+            <a:schemeClr val="accent1"/>
+          </a:lnRef>
+          <a:fillRef idx="3">
+            <a:schemeClr val="accent1"/>
+          </a:fillRef>
+          <a:effectRef idx="2">
+            <a:schemeClr val="accent1"/>
+          </a:effectRef>
+          <a:fontRef idx="minor">
+            <a:schemeClr val="lt1"/>
+          </a:fontRef>
+        </p:style>
+        <p:txBody>
+          <a:bodyPr anchor="ctr"/>
+          <a:lstStyle/>
+          <a:p>
+            <a:pPr algn="ctr" fontAlgn="auto">
+              <a:spcBef>
+                <a:spcPts val="0"/>
+              </a:spcBef>
+              <a:spcAft>
+                <a:spcPts val="0"/>
+              </a:spcAft>
+              <a:defRPr/>
+            </a:pPr>
+            <a:endParaRPr lang="en-US" dirty="0"/>
+          </a:p>
+        </p:txBody>
+      </p:sp>
+      <p:sp>
+        <p:nvSpPr>
+          <p:cNvPr id="95" name="Rectangle 5"/>
+          <p:cNvSpPr/>
+          <p:nvPr/>
+        </p:nvSpPr>
+        <p:spPr>
+          <a:xfrm>
+            <a:off x="843492" y="4695259"/>
+            <a:ext cx="612775" cy="145857"/>
+          </a:xfrm>
+          <a:prstGeom prst="rect">
+            <a:avLst/>
+          </a:prstGeom>
+          <a:solidFill>
+            <a:schemeClr val="bg1">
+              <a:lumMod val="85000"/>
+            </a:schemeClr>
+          </a:solidFill>
+          <a:ln>
+            <a:solidFill>
+              <a:schemeClr val="tx1"/>
+            </a:solidFill>
+          </a:ln>
+        </p:spPr>
+        <p:style>
+          <a:lnRef idx="1">
+            <a:schemeClr val="accent1"/>
+          </a:lnRef>
+          <a:fillRef idx="3">
+            <a:schemeClr val="accent1"/>
+          </a:fillRef>
+          <a:effectRef idx="2">
+            <a:schemeClr val="accent1"/>
+          </a:effectRef>
+          <a:fontRef idx="minor">
+            <a:schemeClr val="lt1"/>
+          </a:fontRef>
+        </p:style>
+        <p:txBody>
+          <a:bodyPr anchor="ctr"/>
+          <a:lstStyle/>
+          <a:p>
+            <a:pPr algn="ctr" fontAlgn="auto">
+              <a:spcBef>
+                <a:spcPts val="0"/>
+              </a:spcBef>
+              <a:spcAft>
+                <a:spcPts val="0"/>
+              </a:spcAft>
+              <a:defRPr/>
+            </a:pPr>
+            <a:endParaRPr lang="en-US" dirty="0"/>
+          </a:p>
+        </p:txBody>
+      </p:sp>
+      <p:sp>
+        <p:nvSpPr>
+          <p:cNvPr id="57" name="TextBox 32"/>
+          <p:cNvSpPr txBox="1">
+            <a:spLocks noChangeArrowheads="1"/>
+          </p:cNvSpPr>
+          <p:nvPr/>
+        </p:nvSpPr>
+        <p:spPr bwMode="auto">
+          <a:xfrm>
+            <a:off x="1958056" y="2519975"/>
+            <a:ext cx="1055687" cy="366712"/>
           </a:xfrm>
           <a:prstGeom prst="rect">
             <a:avLst/>
           </a:prstGeom>
           <a:noFill/>
+          <a:ln w="9525">
+            <a:noFill/>
+            <a:miter lim="800000"/>
+            <a:headEnd/>
+            <a:tailEnd/>
+          </a:ln>
         </p:spPr>
         <p:txBody>
-          <a:bodyPr wrap="none" rtlCol="0">
+          <a:bodyPr wrap="none">
             <a:spAutoFit/>
           </a:bodyPr>
           <a:lstStyle/>
           <a:p>
             <a:r>
-              <a:rPr lang="en-US" sz="2400" b="1" dirty="0" smtClean="0"/>
-              <a:t>…..</a:t>
-            </a:r>
-            <a:endParaRPr lang="en-US" sz="2400" b="1" dirty="0"/>
-          </a:p>
-        </p:txBody>
-      </p:sp>
-      <p:sp>
-        <p:nvSpPr>
-          <p:cNvPr id="31" name="TextBox 30"/>
-          <p:cNvSpPr txBox="1"/>
+              <a:rPr lang="en-US" dirty="0">
+                <a:latin typeface="Calibri" pitchFamily="34" charset="0"/>
+              </a:rPr>
+              <a:t>user data</a:t>
+            </a:r>
+          </a:p>
+        </p:txBody>
+      </p:sp>
+      <p:cxnSp>
+        <p:nvCxnSpPr>
+          <p:cNvPr id="58" name="Shape 21"/>
+          <p:cNvCxnSpPr>
+            <a:cxnSpLocks noChangeShapeType="1"/>
+            <a:stCxn id="79" idx="3"/>
+            <a:endCxn id="57" idx="1"/>
+          </p:cNvCxnSpPr>
           <p:nvPr/>
-        </p:nvSpPr>
-        <p:spPr>
+        </p:nvCxnSpPr>
+        <p:spPr bwMode="auto">
+          <a:xfrm flipV="1">
+            <a:off x="1456267" y="2703331"/>
+            <a:ext cx="501789" cy="808"/>
+          </a:xfrm>
+          <a:prstGeom prst="bentConnector3">
+            <a:avLst>
+              <a:gd name="adj1" fmla="val 50000"/>
+            </a:avLst>
+          </a:prstGeom>
+          <a:noFill/>
+          <a:ln w="25400" algn="ctr">
+            <a:solidFill>
+              <a:schemeClr val="tx1"/>
+            </a:solidFill>
+            <a:miter lim="800000"/>
+            <a:headEnd/>
+            <a:tailEnd type="arrow" w="med" len="med"/>
+          </a:ln>
+          <a:effectLst>
+            <a:outerShdw dist="20000" dir="5400000" rotWithShape="0">
+              <a:srgbClr val="000000">
+                <a:alpha val="37999"/>
+              </a:srgbClr>
+            </a:outerShdw>
+          </a:effectLst>
+        </p:spPr>
+      </p:cxnSp>
+      <p:cxnSp>
+        <p:nvCxnSpPr>
+          <p:cNvPr id="62" name="Shape 21"/>
+          <p:cNvCxnSpPr>
+            <a:cxnSpLocks noChangeShapeType="1"/>
+            <a:stCxn id="80" idx="3"/>
+            <a:endCxn id="64" idx="1"/>
+          </p:cNvCxnSpPr>
+          <p:nvPr/>
+        </p:nvCxnSpPr>
+        <p:spPr bwMode="auto">
+          <a:xfrm flipV="1">
+            <a:off x="1456267" y="2848675"/>
+            <a:ext cx="506027" cy="1321"/>
+          </a:xfrm>
+          <a:prstGeom prst="bentConnector3">
+            <a:avLst>
+              <a:gd name="adj1" fmla="val 50000"/>
+            </a:avLst>
+          </a:prstGeom>
+          <a:noFill/>
+          <a:ln w="25400" algn="ctr">
+            <a:solidFill>
+              <a:schemeClr val="tx1"/>
+            </a:solidFill>
+            <a:miter lim="800000"/>
+            <a:headEnd/>
+            <a:tailEnd type="arrow" w="med" len="med"/>
+          </a:ln>
+          <a:effectLst>
+            <a:outerShdw dist="20000" dir="5400000" rotWithShape="0">
+              <a:srgbClr val="000000">
+                <a:alpha val="37999"/>
+              </a:srgbClr>
+            </a:outerShdw>
+          </a:effectLst>
+        </p:spPr>
+      </p:cxnSp>
+      <p:sp>
+        <p:nvSpPr>
+          <p:cNvPr id="64" name="TextBox 32"/>
+          <p:cNvSpPr txBox="1">
+            <a:spLocks noChangeArrowheads="1"/>
+          </p:cNvSpPr>
+          <p:nvPr/>
+        </p:nvSpPr>
+        <p:spPr bwMode="auto">
           <a:xfrm>
-            <a:off x="1956971" y="1046202"/>
-            <a:ext cx="1005403" cy="369332"/>
+            <a:off x="1962294" y="2665319"/>
+            <a:ext cx="1055687" cy="366712"/>
           </a:xfrm>
           <a:prstGeom prst="rect">
             <a:avLst/>
           </a:prstGeom>
           <a:noFill/>
+          <a:ln w="9525">
+            <a:noFill/>
+            <a:miter lim="800000"/>
+            <a:headEnd/>
+            <a:tailEnd/>
+          </a:ln>
         </p:spPr>
         <p:txBody>
-          <a:bodyPr wrap="none" rtlCol="0">
+          <a:bodyPr wrap="none">
             <a:spAutoFit/>
           </a:bodyPr>
           <a:lstStyle/>
           <a:p>
             <a:r>
-              <a:rPr lang="en-US" dirty="0" err="1" smtClean="0"/>
-              <a:t>ArrayList</a:t>
-            </a:r>
-            <a:endParaRPr lang="en-US" dirty="0"/>
-          </a:p>
-        </p:txBody>
-      </p:sp>
-      <p:sp>
-        <p:nvSpPr>
-          <p:cNvPr id="32" name="TextBox 31"/>
-          <p:cNvSpPr txBox="1"/>
-          <p:nvPr/>
-        </p:nvSpPr>
-        <p:spPr>
-          <a:xfrm>
-            <a:off x="3480971" y="2221468"/>
-            <a:ext cx="945353" cy="369332"/>
-          </a:xfrm>
-          <a:prstGeom prst="rect">
-            <a:avLst/>
-          </a:prstGeom>
-          <a:noFill/>
-        </p:spPr>
-        <p:txBody>
-          <a:bodyPr wrap="none" rtlCol="0">
-            <a:spAutoFit/>
-          </a:bodyPr>
-          <a:lstStyle/>
-          <a:p>
-            <a:r>
-              <a:rPr lang="en-US" dirty="0" smtClean="0"/>
-              <a:t>Object[]</a:t>
-            </a:r>
-            <a:endParaRPr lang="en-US" dirty="0"/>
-          </a:p>
-        </p:txBody>
-      </p:sp>
-      <p:sp>
-        <p:nvSpPr>
-          <p:cNvPr id="38" name="Rectangle 37"/>
-          <p:cNvSpPr/>
-          <p:nvPr/>
-        </p:nvSpPr>
-        <p:spPr>
-          <a:xfrm>
-            <a:off x="5614571" y="2634734"/>
-            <a:ext cx="4572000" cy="584776"/>
-          </a:xfrm>
-          <a:prstGeom prst="rect">
-            <a:avLst/>
-          </a:prstGeom>
-        </p:spPr>
-        <p:txBody>
-          <a:bodyPr>
-            <a:spAutoFit/>
-          </a:bodyPr>
-          <a:lstStyle/>
-          <a:p>
-            <a:r>
-              <a:rPr lang="en-US" sz="1600" i="1" dirty="0" smtClean="0"/>
-              <a:t>  Default size 10 entries: 56 bytes </a:t>
-            </a:r>
-          </a:p>
-          <a:p>
-            <a:endParaRPr lang="en-US" sz="1600" i="1" dirty="0" smtClean="0"/>
-          </a:p>
-        </p:txBody>
-      </p:sp>
-      <p:sp>
-        <p:nvSpPr>
-          <p:cNvPr id="14" name="TextBox 13"/>
-          <p:cNvSpPr txBox="1"/>
-          <p:nvPr/>
-        </p:nvSpPr>
-        <p:spPr>
-          <a:xfrm>
-            <a:off x="4090571" y="1415534"/>
-            <a:ext cx="1763010" cy="338554"/>
-          </a:xfrm>
-          <a:prstGeom prst="rect">
-            <a:avLst/>
-          </a:prstGeom>
-          <a:noFill/>
-        </p:spPr>
-        <p:txBody>
-          <a:bodyPr wrap="none" rtlCol="0">
-            <a:spAutoFit/>
-          </a:bodyPr>
-          <a:lstStyle/>
-          <a:p>
-            <a:r>
-              <a:rPr lang="en-US" sz="1600" i="1" dirty="0" smtClean="0"/>
-              <a:t>Wrapper: 24 bytes</a:t>
-            </a:r>
-            <a:endParaRPr lang="en-US" sz="1600" i="1" dirty="0"/>
-          </a:p>
-        </p:txBody>
-      </p:sp>
-      <p:sp>
-        <p:nvSpPr>
-          <p:cNvPr id="15" name="TextBox 14"/>
-          <p:cNvSpPr txBox="1"/>
-          <p:nvPr/>
-        </p:nvSpPr>
-        <p:spPr>
-          <a:xfrm>
-            <a:off x="6096000" y="4582180"/>
-            <a:ext cx="2104550" cy="584776"/>
-          </a:xfrm>
-          <a:prstGeom prst="rect">
-            <a:avLst/>
-          </a:prstGeom>
-          <a:noFill/>
-        </p:spPr>
-        <p:txBody>
-          <a:bodyPr wrap="none" rtlCol="0">
-            <a:spAutoFit/>
-          </a:bodyPr>
-          <a:lstStyle/>
-          <a:p>
-            <a:r>
-              <a:rPr lang="en-US" sz="1600" i="1" dirty="0" smtClean="0"/>
-              <a:t>E</a:t>
-            </a:r>
-            <a:r>
-              <a:rPr lang="en-US" sz="1600" i="1" dirty="0" smtClean="0"/>
-              <a:t>lement </a:t>
-            </a:r>
-            <a:r>
-              <a:rPr lang="en-US" sz="1600" i="1" dirty="0" smtClean="0"/>
-              <a:t>cost is 4 bytes</a:t>
-            </a:r>
-          </a:p>
-          <a:p>
-            <a:r>
-              <a:rPr lang="en-US" sz="1600" i="1" dirty="0" smtClean="0"/>
-              <a:t>in the array Object[]</a:t>
-            </a:r>
-            <a:endParaRPr lang="en-US" sz="1600" i="1" dirty="0"/>
+              <a:rPr lang="en-US" dirty="0">
+                <a:latin typeface="Calibri" pitchFamily="34" charset="0"/>
+              </a:rPr>
+              <a:t>user data</a:t>
+            </a:r>
           </a:p>
         </p:txBody>
       </p:sp>
     </p:spTree>
+    <p:extLst>
+      <p:ext uri="{BB962C8B-B14F-4D97-AF65-F5344CB8AC3E}">
+        <p14:creationId xmlns:p14="http://schemas.microsoft.com/office/powerpoint/2010/main" val="3540330424"/>
+      </p:ext>
+    </p:extLst>
   </p:cSld>
   <p:clrMapOvr>
     <a:masterClrMapping/>
@@ -3876,4 +5894,324 @@
   </a:objectDefaults>
   <a:extraClrSchemeLst/>
 </a:theme>
+</file>
+
+<file path=ppt/theme/theme2.xml><?xml version="1.0" encoding="utf-8"?>
+<a:theme xmlns:a="http://schemas.openxmlformats.org/drawingml/2006/main" name="Office Theme">
+  <a:themeElements>
+    <a:clrScheme name="Office">
+      <a:dk1>
+        <a:sysClr val="windowText" lastClr="000000"/>
+      </a:dk1>
+      <a:lt1>
+        <a:sysClr val="window" lastClr="FFFFFF"/>
+      </a:lt1>
+      <a:dk2>
+        <a:srgbClr val="1F497D"/>
+      </a:dk2>
+      <a:lt2>
+        <a:srgbClr val="EEECE1"/>
+      </a:lt2>
+      <a:accent1>
+        <a:srgbClr val="4F81BD"/>
+      </a:accent1>
+      <a:accent2>
+        <a:srgbClr val="C0504D"/>
+      </a:accent2>
+      <a:accent3>
+        <a:srgbClr val="9BBB59"/>
+      </a:accent3>
+      <a:accent4>
+        <a:srgbClr val="8064A2"/>
+      </a:accent4>
+      <a:accent5>
+        <a:srgbClr val="4BACC6"/>
+      </a:accent5>
+      <a:accent6>
+        <a:srgbClr val="F79646"/>
+      </a:accent6>
+      <a:hlink>
+        <a:srgbClr val="0000FF"/>
+      </a:hlink>
+      <a:folHlink>
+        <a:srgbClr val="800080"/>
+      </a:folHlink>
+    </a:clrScheme>
+    <a:fontScheme name="Office">
+      <a:majorFont>
+        <a:latin typeface="Calibri"/>
+        <a:ea typeface=""/>
+        <a:cs typeface=""/>
+        <a:font script="Jpan" typeface="ＭＳ Ｐゴシック"/>
+        <a:font script="Hang" typeface="맑은 고딕"/>
+        <a:font script="Hans" typeface="宋体"/>
+        <a:font script="Hant" typeface="新細明體"/>
+        <a:font script="Arab" typeface="Times New Roman"/>
+        <a:font script="Hebr" typeface="Times New Roman"/>
+        <a:font script="Thai" typeface="Angsana New"/>
+        <a:font script="Ethi" typeface="Nyala"/>
+        <a:font script="Beng" typeface="Vrinda"/>
+        <a:font script="Gujr" typeface="Shruti"/>
+        <a:font script="Khmr" typeface="MoolBoran"/>
+        <a:font script="Knda" typeface="Tunga"/>
+        <a:font script="Guru" typeface="Raavi"/>
+        <a:font script="Cans" typeface="Euphemia"/>
+        <a:font script="Cher" typeface="Plantagenet Cherokee"/>
+        <a:font script="Yiii" typeface="Microsoft Yi Baiti"/>
+        <a:font script="Tibt" typeface="Microsoft Himalaya"/>
+        <a:font script="Thaa" typeface="MV Boli"/>
+        <a:font script="Deva" typeface="Mangal"/>
+        <a:font script="Telu" typeface="Gautami"/>
+        <a:font script="Taml" typeface="Latha"/>
+        <a:font script="Syrc" typeface="Estrangelo Edessa"/>
+        <a:font script="Orya" typeface="Kalinga"/>
+        <a:font script="Mlym" typeface="Kartika"/>
+        <a:font script="Laoo" typeface="DokChampa"/>
+        <a:font script="Sinh" typeface="Iskoola Pota"/>
+        <a:font script="Mong" typeface="Mongolian Baiti"/>
+        <a:font script="Viet" typeface="Times New Roman"/>
+        <a:font script="Uigh" typeface="Microsoft Uighur"/>
+        <a:font script="Geor" typeface="Sylfaen"/>
+      </a:majorFont>
+      <a:minorFont>
+        <a:latin typeface="Calibri"/>
+        <a:ea typeface=""/>
+        <a:cs typeface=""/>
+        <a:font script="Jpan" typeface="ＭＳ Ｐゴシック"/>
+        <a:font script="Hang" typeface="맑은 고딕"/>
+        <a:font script="Hans" typeface="宋体"/>
+        <a:font script="Hant" typeface="新細明體"/>
+        <a:font script="Arab" typeface="Arial"/>
+        <a:font script="Hebr" typeface="Arial"/>
+        <a:font script="Thai" typeface="Cordia New"/>
+        <a:font script="Ethi" typeface="Nyala"/>
+        <a:font script="Beng" typeface="Vrinda"/>
+        <a:font script="Gujr" typeface="Shruti"/>
+        <a:font script="Khmr" typeface="DaunPenh"/>
+        <a:font script="Knda" typeface="Tunga"/>
+        <a:font script="Guru" typeface="Raavi"/>
+        <a:font script="Cans" typeface="Euphemia"/>
+        <a:font script="Cher" typeface="Plantagenet Cherokee"/>
+        <a:font script="Yiii" typeface="Microsoft Yi Baiti"/>
+        <a:font script="Tibt" typeface="Microsoft Himalaya"/>
+        <a:font script="Thaa" typeface="MV Boli"/>
+        <a:font script="Deva" typeface="Mangal"/>
+        <a:font script="Telu" typeface="Gautami"/>
+        <a:font script="Taml" typeface="Latha"/>
+        <a:font script="Syrc" typeface="Estrangelo Edessa"/>
+        <a:font script="Orya" typeface="Kalinga"/>
+        <a:font script="Mlym" typeface="Kartika"/>
+        <a:font script="Laoo" typeface="DokChampa"/>
+        <a:font script="Sinh" typeface="Iskoola Pota"/>
+        <a:font script="Mong" typeface="Mongolian Baiti"/>
+        <a:font script="Viet" typeface="Arial"/>
+        <a:font script="Uigh" typeface="Microsoft Uighur"/>
+        <a:font script="Geor" typeface="Sylfaen"/>
+      </a:minorFont>
+    </a:fontScheme>
+    <a:fmtScheme name="Office">
+      <a:fillStyleLst>
+        <a:solidFill>
+          <a:schemeClr val="phClr"/>
+        </a:solidFill>
+        <a:gradFill rotWithShape="1">
+          <a:gsLst>
+            <a:gs pos="0">
+              <a:schemeClr val="phClr">
+                <a:tint val="50000"/>
+                <a:satMod val="300000"/>
+              </a:schemeClr>
+            </a:gs>
+            <a:gs pos="35000">
+              <a:schemeClr val="phClr">
+                <a:tint val="37000"/>
+                <a:satMod val="300000"/>
+              </a:schemeClr>
+            </a:gs>
+            <a:gs pos="100000">
+              <a:schemeClr val="phClr">
+                <a:tint val="15000"/>
+                <a:satMod val="350000"/>
+              </a:schemeClr>
+            </a:gs>
+          </a:gsLst>
+          <a:lin ang="16200000" scaled="1"/>
+        </a:gradFill>
+        <a:gradFill rotWithShape="1">
+          <a:gsLst>
+            <a:gs pos="0">
+              <a:schemeClr val="phClr">
+                <a:tint val="100000"/>
+                <a:shade val="100000"/>
+                <a:satMod val="130000"/>
+              </a:schemeClr>
+            </a:gs>
+            <a:gs pos="100000">
+              <a:schemeClr val="phClr">
+                <a:tint val="50000"/>
+                <a:shade val="100000"/>
+                <a:satMod val="350000"/>
+              </a:schemeClr>
+            </a:gs>
+          </a:gsLst>
+          <a:lin ang="16200000" scaled="0"/>
+        </a:gradFill>
+      </a:fillStyleLst>
+      <a:lnStyleLst>
+        <a:ln w="9525" cap="flat" cmpd="sng" algn="ctr">
+          <a:solidFill>
+            <a:schemeClr val="phClr">
+              <a:shade val="95000"/>
+              <a:satMod val="105000"/>
+            </a:schemeClr>
+          </a:solidFill>
+          <a:prstDash val="solid"/>
+        </a:ln>
+        <a:ln w="25400" cap="flat" cmpd="sng" algn="ctr">
+          <a:solidFill>
+            <a:schemeClr val="phClr"/>
+          </a:solidFill>
+          <a:prstDash val="solid"/>
+        </a:ln>
+        <a:ln w="38100" cap="flat" cmpd="sng" algn="ctr">
+          <a:solidFill>
+            <a:schemeClr val="phClr"/>
+          </a:solidFill>
+          <a:prstDash val="solid"/>
+        </a:ln>
+      </a:lnStyleLst>
+      <a:effectStyleLst>
+        <a:effectStyle>
+          <a:effectLst>
+            <a:outerShdw blurRad="40000" dist="20000" dir="5400000" rotWithShape="0">
+              <a:srgbClr val="000000">
+                <a:alpha val="38000"/>
+              </a:srgbClr>
+            </a:outerShdw>
+          </a:effectLst>
+        </a:effectStyle>
+        <a:effectStyle>
+          <a:effectLst>
+            <a:outerShdw blurRad="40000" dist="23000" dir="5400000" rotWithShape="0">
+              <a:srgbClr val="000000">
+                <a:alpha val="35000"/>
+              </a:srgbClr>
+            </a:outerShdw>
+          </a:effectLst>
+        </a:effectStyle>
+        <a:effectStyle>
+          <a:effectLst>
+            <a:outerShdw blurRad="40000" dist="23000" dir="5400000" rotWithShape="0">
+              <a:srgbClr val="000000">
+                <a:alpha val="35000"/>
+              </a:srgbClr>
+            </a:outerShdw>
+          </a:effectLst>
+          <a:scene3d>
+            <a:camera prst="orthographicFront">
+              <a:rot lat="0" lon="0" rev="0"/>
+            </a:camera>
+            <a:lightRig rig="threePt" dir="t">
+              <a:rot lat="0" lon="0" rev="1200000"/>
+            </a:lightRig>
+          </a:scene3d>
+          <a:sp3d>
+            <a:bevelT w="63500" h="25400"/>
+          </a:sp3d>
+        </a:effectStyle>
+      </a:effectStyleLst>
+      <a:bgFillStyleLst>
+        <a:solidFill>
+          <a:schemeClr val="phClr"/>
+        </a:solidFill>
+        <a:gradFill rotWithShape="1">
+          <a:gsLst>
+            <a:gs pos="0">
+              <a:schemeClr val="phClr">
+                <a:tint val="40000"/>
+                <a:satMod val="350000"/>
+              </a:schemeClr>
+            </a:gs>
+            <a:gs pos="40000">
+              <a:schemeClr val="phClr">
+                <a:tint val="45000"/>
+                <a:shade val="99000"/>
+                <a:satMod val="350000"/>
+              </a:schemeClr>
+            </a:gs>
+            <a:gs pos="100000">
+              <a:schemeClr val="phClr">
+                <a:shade val="20000"/>
+                <a:satMod val="255000"/>
+              </a:schemeClr>
+            </a:gs>
+          </a:gsLst>
+          <a:path path="circle">
+            <a:fillToRect l="50000" t="-80000" r="50000" b="180000"/>
+          </a:path>
+        </a:gradFill>
+        <a:gradFill rotWithShape="1">
+          <a:gsLst>
+            <a:gs pos="0">
+              <a:schemeClr val="phClr">
+                <a:tint val="80000"/>
+                <a:satMod val="300000"/>
+              </a:schemeClr>
+            </a:gs>
+            <a:gs pos="100000">
+              <a:schemeClr val="phClr">
+                <a:shade val="30000"/>
+                <a:satMod val="200000"/>
+              </a:schemeClr>
+            </a:gs>
+          </a:gsLst>
+          <a:path path="circle">
+            <a:fillToRect l="50000" t="50000" r="50000" b="50000"/>
+          </a:path>
+        </a:gradFill>
+      </a:bgFillStyleLst>
+    </a:fmtScheme>
+  </a:themeElements>
+  <a:objectDefaults>
+    <a:spDef>
+      <a:spPr/>
+      <a:bodyPr/>
+      <a:lstStyle/>
+      <a:style>
+        <a:lnRef idx="1">
+          <a:schemeClr val="accent1"/>
+        </a:lnRef>
+        <a:fillRef idx="3">
+          <a:schemeClr val="accent1"/>
+        </a:fillRef>
+        <a:effectRef idx="2">
+          <a:schemeClr val="accent1"/>
+        </a:effectRef>
+        <a:fontRef idx="minor">
+          <a:schemeClr val="lt1"/>
+        </a:fontRef>
+      </a:style>
+    </a:spDef>
+    <a:lnDef>
+      <a:spPr/>
+      <a:bodyPr/>
+      <a:lstStyle/>
+      <a:style>
+        <a:lnRef idx="2">
+          <a:schemeClr val="accent1"/>
+        </a:lnRef>
+        <a:fillRef idx="0">
+          <a:schemeClr val="accent1"/>
+        </a:fillRef>
+        <a:effectRef idx="1">
+          <a:schemeClr val="accent1"/>
+        </a:effectRef>
+        <a:fontRef idx="minor">
+          <a:schemeClr val="tx1"/>
+        </a:fontRef>
+      </a:style>
+    </a:lnDef>
+  </a:objectDefaults>
+  <a:extraClrSchemeLst/>
+</a:theme>
 </file>
</xml_diff>